<commit_message>
adding bg tdf info
</commit_message>
<xml_diff>
--- a/day05/slides/Day5_slides.pptx
+++ b/day05/slides/Day5_slides.pptx
@@ -5,33 +5,35 @@
     <p:sldMasterId id="2147483659" r:id="rId1"/>
   </p:sldMasterIdLst>
   <p:notesMasterIdLst>
-    <p:notesMasterId r:id="rId9"/>
+    <p:notesMasterId r:id="rId11"/>
   </p:notesMasterIdLst>
   <p:sldIdLst>
     <p:sldId id="256" r:id="rId2"/>
     <p:sldId id="257" r:id="rId3"/>
-    <p:sldId id="263" r:id="rId4"/>
-    <p:sldId id="269" r:id="rId5"/>
+    <p:sldId id="259" r:id="rId4"/>
+    <p:sldId id="260" r:id="rId5"/>
     <p:sldId id="270" r:id="rId6"/>
-    <p:sldId id="267" r:id="rId7"/>
-    <p:sldId id="266" r:id="rId8"/>
+    <p:sldId id="263" r:id="rId7"/>
+    <p:sldId id="269" r:id="rId8"/>
+    <p:sldId id="267" r:id="rId9"/>
+    <p:sldId id="266" r:id="rId10"/>
   </p:sldIdLst>
   <p:sldSz cx="9144000" cy="5143500" type="screen16x9"/>
   <p:notesSz cx="6858000" cy="9144000"/>
   <p:embeddedFontLst>
     <p:embeddedFont>
       <p:font typeface="Calibri" panose="020F0502020204030204" pitchFamily="34" charset="0"/>
-      <p:regular r:id="rId10"/>
-      <p:bold r:id="rId11"/>
-      <p:italic r:id="rId12"/>
-      <p:boldItalic r:id="rId13"/>
+      <p:regular r:id="rId12"/>
+      <p:bold r:id="rId13"/>
+      <p:italic r:id="rId14"/>
+      <p:boldItalic r:id="rId15"/>
     </p:embeddedFont>
     <p:embeddedFont>
       <p:font typeface="Helvetica Neue" panose="02000503000000020004" pitchFamily="2" charset="0"/>
-      <p:regular r:id="rId14"/>
-      <p:bold r:id="rId15"/>
-      <p:italic r:id="rId16"/>
-      <p:boldItalic r:id="rId17"/>
+      <p:regular r:id="rId16"/>
+      <p:bold r:id="rId17"/>
+      <p:italic r:id="rId18"/>
+      <p:boldItalic r:id="rId19"/>
     </p:embeddedFont>
   </p:embeddedFontLst>
   <p:defaultTextStyle>
@@ -936,7 +938,7 @@
   <p:cSld>
     <p:spTree>
       <p:nvGrpSpPr>
-        <p:cNvPr id="1" name="Shape 124"/>
+        <p:cNvPr id="1" name="Shape 69"/>
         <p:cNvGrpSpPr/>
         <p:nvPr/>
       </p:nvGrpSpPr>
@@ -950,7 +952,7 @@
       </p:grpSpPr>
       <p:sp>
         <p:nvSpPr>
-          <p:cNvPr id="125" name="Google Shape;125;g13a6768cd7a_0_77:notes"/>
+          <p:cNvPr id="70" name="Google Shape;70;g13a6768cd7a_0_0:notes"/>
           <p:cNvSpPr>
             <a:spLocks noGrp="1" noRot="1" noChangeAspect="1"/>
           </p:cNvSpPr>
@@ -960,7 +962,7 @@
         </p:nvSpPr>
         <p:spPr>
           <a:xfrm>
-            <a:off x="381000" y="685800"/>
+            <a:off x="381300" y="685800"/>
             <a:ext cx="6096000" cy="3429000"/>
           </a:xfrm>
           <a:custGeom>
@@ -991,7 +993,7 @@
       </p:sp>
       <p:sp>
         <p:nvSpPr>
-          <p:cNvPr id="126" name="Google Shape;126;g13a6768cd7a_0_77:notes"/>
+          <p:cNvPr id="71" name="Google Shape;71;g13a6768cd7a_0_0:notes"/>
           <p:cNvSpPr txBox="1">
             <a:spLocks noGrp="1"/>
           </p:cNvSpPr>
@@ -1036,6 +1038,110 @@
 </file>
 
 <file path=ppt/notesSlides/notesSlide4.xml><?xml version="1.0" encoding="utf-8"?>
+<p:notes xmlns:a="http://schemas.openxmlformats.org/drawingml/2006/main" xmlns:r="http://schemas.openxmlformats.org/officeDocument/2006/relationships" xmlns:p="http://schemas.openxmlformats.org/presentationml/2006/main" showMasterSp="0" showMasterPhAnim="0">
+  <p:cSld>
+    <p:spTree>
+      <p:nvGrpSpPr>
+        <p:cNvPr id="1" name="Shape 84"/>
+        <p:cNvGrpSpPr/>
+        <p:nvPr/>
+      </p:nvGrpSpPr>
+      <p:grpSpPr>
+        <a:xfrm>
+          <a:off x="0" y="0"/>
+          <a:ext cx="0" cy="0"/>
+          <a:chOff x="0" y="0"/>
+          <a:chExt cx="0" cy="0"/>
+        </a:xfrm>
+      </p:grpSpPr>
+      <p:sp>
+        <p:nvSpPr>
+          <p:cNvPr id="85" name="Google Shape;85;g13a6768cd7a_0_6:notes"/>
+          <p:cNvSpPr>
+            <a:spLocks noGrp="1" noRot="1" noChangeAspect="1"/>
+          </p:cNvSpPr>
+          <p:nvPr>
+            <p:ph type="sldImg" idx="2"/>
+          </p:nvPr>
+        </p:nvSpPr>
+        <p:spPr>
+          <a:xfrm>
+            <a:off x="381300" y="685800"/>
+            <a:ext cx="6096000" cy="3429000"/>
+          </a:xfrm>
+          <a:custGeom>
+            <a:avLst/>
+            <a:gdLst/>
+            <a:ahLst/>
+            <a:cxnLst/>
+            <a:rect l="l" t="t" r="r" b="b"/>
+            <a:pathLst>
+              <a:path w="120000" h="120000" extrusionOk="0">
+                <a:moveTo>
+                  <a:pt x="0" y="0"/>
+                </a:moveTo>
+                <a:lnTo>
+                  <a:pt x="120000" y="0"/>
+                </a:lnTo>
+                <a:lnTo>
+                  <a:pt x="120000" y="120000"/>
+                </a:lnTo>
+                <a:lnTo>
+                  <a:pt x="0" y="120000"/>
+                </a:lnTo>
+                <a:close/>
+              </a:path>
+            </a:pathLst>
+          </a:custGeom>
+        </p:spPr>
+      </p:sp>
+      <p:sp>
+        <p:nvSpPr>
+          <p:cNvPr id="86" name="Google Shape;86;g13a6768cd7a_0_6:notes"/>
+          <p:cNvSpPr txBox="1">
+            <a:spLocks noGrp="1"/>
+          </p:cNvSpPr>
+          <p:nvPr>
+            <p:ph type="body" idx="1"/>
+          </p:nvPr>
+        </p:nvSpPr>
+        <p:spPr>
+          <a:xfrm>
+            <a:off x="685800" y="4343400"/>
+            <a:ext cx="5486400" cy="4114800"/>
+          </a:xfrm>
+          <a:prstGeom prst="rect">
+            <a:avLst/>
+          </a:prstGeom>
+        </p:spPr>
+        <p:txBody>
+          <a:bodyPr spcFirstLastPara="1" wrap="square" lIns="91425" tIns="91425" rIns="91425" bIns="91425" anchor="t" anchorCtr="0">
+            <a:noAutofit/>
+          </a:bodyPr>
+          <a:lstStyle/>
+          <a:p>
+            <a:pPr marL="0" lvl="0" indent="0" algn="l" rtl="0">
+              <a:spcBef>
+                <a:spcPts val="0"/>
+              </a:spcBef>
+              <a:spcAft>
+                <a:spcPts val="0"/>
+              </a:spcAft>
+              <a:buNone/>
+            </a:pPr>
+            <a:endParaRPr/>
+          </a:p>
+        </p:txBody>
+      </p:sp>
+    </p:spTree>
+  </p:cSld>
+  <p:clrMapOvr>
+    <a:masterClrMapping/>
+  </p:clrMapOvr>
+</p:notes>
+</file>
+
+<file path=ppt/notesSlides/notesSlide5.xml><?xml version="1.0" encoding="utf-8"?>
 <p:notes xmlns:a="http://schemas.openxmlformats.org/drawingml/2006/main" xmlns:r="http://schemas.openxmlformats.org/officeDocument/2006/relationships" xmlns:p="http://schemas.openxmlformats.org/presentationml/2006/main" showMasterSp="0" showMasterPhAnim="0">
   <p:cSld>
     <p:spTree>
@@ -1132,6 +1238,110 @@
         </p:txBody>
       </p:sp>
     </p:spTree>
+  </p:cSld>
+  <p:clrMapOvr>
+    <a:masterClrMapping/>
+  </p:clrMapOvr>
+</p:notes>
+</file>
+
+<file path=ppt/notesSlides/notesSlide6.xml><?xml version="1.0" encoding="utf-8"?>
+<p:notes xmlns:a="http://schemas.openxmlformats.org/drawingml/2006/main" xmlns:r="http://schemas.openxmlformats.org/officeDocument/2006/relationships" xmlns:p="http://schemas.openxmlformats.org/presentationml/2006/main" showMasterSp="0" showMasterPhAnim="0">
+  <p:cSld>
+    <p:spTree>
+      <p:nvGrpSpPr>
+        <p:cNvPr id="1" name="Shape 124"/>
+        <p:cNvGrpSpPr/>
+        <p:nvPr/>
+      </p:nvGrpSpPr>
+      <p:grpSpPr>
+        <a:xfrm>
+          <a:off x="0" y="0"/>
+          <a:ext cx="0" cy="0"/>
+          <a:chOff x="0" y="0"/>
+          <a:chExt cx="0" cy="0"/>
+        </a:xfrm>
+      </p:grpSpPr>
+      <p:sp>
+        <p:nvSpPr>
+          <p:cNvPr id="125" name="Google Shape;125;g13a6768cd7a_0_77:notes"/>
+          <p:cNvSpPr>
+            <a:spLocks noGrp="1" noRot="1" noChangeAspect="1"/>
+          </p:cNvSpPr>
+          <p:nvPr>
+            <p:ph type="sldImg" idx="2"/>
+          </p:nvPr>
+        </p:nvSpPr>
+        <p:spPr>
+          <a:xfrm>
+            <a:off x="381000" y="685800"/>
+            <a:ext cx="6096000" cy="3429000"/>
+          </a:xfrm>
+          <a:custGeom>
+            <a:avLst/>
+            <a:gdLst/>
+            <a:ahLst/>
+            <a:cxnLst/>
+            <a:rect l="l" t="t" r="r" b="b"/>
+            <a:pathLst>
+              <a:path w="120000" h="120000" extrusionOk="0">
+                <a:moveTo>
+                  <a:pt x="0" y="0"/>
+                </a:moveTo>
+                <a:lnTo>
+                  <a:pt x="120000" y="0"/>
+                </a:lnTo>
+                <a:lnTo>
+                  <a:pt x="120000" y="120000"/>
+                </a:lnTo>
+                <a:lnTo>
+                  <a:pt x="0" y="120000"/>
+                </a:lnTo>
+                <a:close/>
+              </a:path>
+            </a:pathLst>
+          </a:custGeom>
+        </p:spPr>
+      </p:sp>
+      <p:sp>
+        <p:nvSpPr>
+          <p:cNvPr id="126" name="Google Shape;126;g13a6768cd7a_0_77:notes"/>
+          <p:cNvSpPr txBox="1">
+            <a:spLocks noGrp="1"/>
+          </p:cNvSpPr>
+          <p:nvPr>
+            <p:ph type="body" idx="1"/>
+          </p:nvPr>
+        </p:nvSpPr>
+        <p:spPr>
+          <a:xfrm>
+            <a:off x="685800" y="4343400"/>
+            <a:ext cx="5486400" cy="4114800"/>
+          </a:xfrm>
+          <a:prstGeom prst="rect">
+            <a:avLst/>
+          </a:prstGeom>
+        </p:spPr>
+        <p:txBody>
+          <a:bodyPr spcFirstLastPara="1" wrap="square" lIns="91425" tIns="91425" rIns="91425" bIns="91425" anchor="t" anchorCtr="0">
+            <a:noAutofit/>
+          </a:bodyPr>
+          <a:lstStyle/>
+          <a:p>
+            <a:pPr marL="0" lvl="0" indent="0" algn="l" rtl="0">
+              <a:spcBef>
+                <a:spcPts val="0"/>
+              </a:spcBef>
+              <a:spcAft>
+                <a:spcPts val="0"/>
+              </a:spcAft>
+              <a:buNone/>
+            </a:pPr>
+            <a:endParaRPr/>
+          </a:p>
+        </p:txBody>
+      </p:sp>
+    </p:spTree>
     <p:extLst>
       <p:ext uri="{BB962C8B-B14F-4D97-AF65-F5344CB8AC3E}">
         <p14:creationId xmlns:p14="http://schemas.microsoft.com/office/powerpoint/2010/main" val="288276008"/>
@@ -1144,7 +1354,7 @@
 </p:notes>
 </file>
 
-<file path=ppt/notesSlides/notesSlide5.xml><?xml version="1.0" encoding="utf-8"?>
+<file path=ppt/notesSlides/notesSlide7.xml><?xml version="1.0" encoding="utf-8"?>
 <p:notes xmlns:a="http://schemas.openxmlformats.org/drawingml/2006/main" xmlns:r="http://schemas.openxmlformats.org/officeDocument/2006/relationships" xmlns:p="http://schemas.openxmlformats.org/presentationml/2006/main" showMasterSp="0" showMasterPhAnim="0">
   <p:cSld>
     <p:spTree>
@@ -6494,24 +6704,11 @@
             </a:pPr>
             <a:r>
               <a:rPr lang="en" sz="2020" dirty="0"/>
-              <a:t>Processing high throughput sequencing files (FASTQ) to obtain a reference genome aligned/mapped SAM/BAM files, and conversion to TDFs for visualization</a:t>
+              <a:t>Processing high throughput sequencing files (FASTQ) to obtain a reference genome aligned/mapped SAM/BAM files</a:t>
             </a:r>
-            <a:endParaRPr sz="2020" dirty="0"/>
-          </a:p>
-          <a:p>
-            <a:pPr marL="0" lvl="0" indent="0" algn="l" rtl="0">
-              <a:lnSpc>
-                <a:spcPct val="100000"/>
-              </a:lnSpc>
-              <a:spcBef>
-                <a:spcPts val="0"/>
-              </a:spcBef>
-              <a:spcAft>
-                <a:spcPts val="0"/>
-              </a:spcAft>
-              <a:buSzPct val="49009"/>
-              <a:buNone/>
-            </a:pPr>
+            <a:br>
+              <a:rPr lang="en" sz="2020" dirty="0"/>
+            </a:br>
             <a:endParaRPr sz="2020" dirty="0"/>
           </a:p>
           <a:p>
@@ -6530,7 +6727,7 @@
             </a:pPr>
             <a:r>
               <a:rPr lang="en" sz="2242" b="1" u="sng" dirty="0"/>
-              <a:t>Today:</a:t>
+              <a:t>Goals for today:</a:t>
             </a:r>
             <a:endParaRPr sz="2242" b="1" u="sng" dirty="0"/>
           </a:p>
@@ -6549,28 +6746,31 @@
               <a:buNone/>
             </a:pPr>
             <a:r>
-              <a:rPr lang="en" sz="2242" dirty="0"/>
-              <a:t>Part 1 (1 hour): For loops, and TDF visualization on the IGV Desktop App.</a:t>
+              <a:rPr lang="en" sz="2242" b="1" dirty="0"/>
+              <a:t>Part 1 (1 hour): </a:t>
             </a:r>
-            <a:endParaRPr sz="2242" dirty="0"/>
-          </a:p>
-          <a:p>
-            <a:pPr marL="0" lvl="0" indent="0" algn="l" rtl="0">
-              <a:lnSpc>
-                <a:spcPct val="115000"/>
-              </a:lnSpc>
-              <a:spcBef>
-                <a:spcPts val="0"/>
-              </a:spcBef>
-              <a:spcAft>
-                <a:spcPts val="0"/>
-              </a:spcAft>
-              <a:buSzPct val="44152"/>
-              <a:buNone/>
-            </a:pPr>
             <a:r>
               <a:rPr lang="en" sz="2242" dirty="0"/>
-              <a:t>Part 2 (2 hours): Assessment of skills learned up to today.</a:t>
+              <a:t>Create </a:t>
+            </a:r>
+            <a:r>
+              <a:rPr lang="en" sz="2242" dirty="0" err="1"/>
+              <a:t>BedGraphs</a:t>
+            </a:r>
+            <a:r>
+              <a:rPr lang="en" sz="2242" dirty="0"/>
+              <a:t> and TDFs for visualization (For loops if we have time)</a:t>
+            </a:r>
+            <a:br>
+              <a:rPr lang="en" sz="2242" dirty="0"/>
+            </a:br>
+            <a:r>
+              <a:rPr lang="en" sz="2242" b="1" dirty="0"/>
+              <a:t>Part 2 (2 hours): </a:t>
+            </a:r>
+            <a:r>
+              <a:rPr lang="en" sz="2242" dirty="0"/>
+              <a:t>Assessment of skills learned up to today.</a:t>
             </a:r>
             <a:endParaRPr sz="2242" dirty="0"/>
           </a:p>
@@ -6585,6 +6785,1143 @@
 </file>
 
 <file path=ppt/slides/slide3.xml><?xml version="1.0" encoding="utf-8"?>
+<p:sld xmlns:a="http://schemas.openxmlformats.org/drawingml/2006/main" xmlns:r="http://schemas.openxmlformats.org/officeDocument/2006/relationships" xmlns:p="http://schemas.openxmlformats.org/presentationml/2006/main">
+  <p:cSld>
+    <p:spTree>
+      <p:nvGrpSpPr>
+        <p:cNvPr id="1" name="Shape 72"/>
+        <p:cNvGrpSpPr/>
+        <p:nvPr/>
+      </p:nvGrpSpPr>
+      <p:grpSpPr>
+        <a:xfrm>
+          <a:off x="0" y="0"/>
+          <a:ext cx="0" cy="0"/>
+          <a:chOff x="0" y="0"/>
+          <a:chExt cx="0" cy="0"/>
+        </a:xfrm>
+      </p:grpSpPr>
+      <p:pic>
+        <p:nvPicPr>
+          <p:cNvPr id="73" name="Google Shape;73;p16"/>
+          <p:cNvPicPr preferRelativeResize="0"/>
+          <p:nvPr/>
+        </p:nvPicPr>
+        <p:blipFill>
+          <a:blip r:embed="rId3">
+            <a:alphaModFix/>
+          </a:blip>
+          <a:stretch>
+            <a:fillRect/>
+          </a:stretch>
+        </p:blipFill>
+        <p:spPr>
+          <a:xfrm>
+            <a:off x="919975" y="1245363"/>
+            <a:ext cx="8071624" cy="3719575"/>
+          </a:xfrm>
+          <a:prstGeom prst="rect">
+            <a:avLst/>
+          </a:prstGeom>
+          <a:noFill/>
+          <a:ln w="9525" cap="flat" cmpd="sng">
+            <a:solidFill>
+              <a:schemeClr val="dk1"/>
+            </a:solidFill>
+            <a:prstDash val="solid"/>
+            <a:round/>
+            <a:headEnd type="none" w="sm" len="sm"/>
+            <a:tailEnd type="none" w="sm" len="sm"/>
+          </a:ln>
+        </p:spPr>
+      </p:pic>
+      <p:sp>
+        <p:nvSpPr>
+          <p:cNvPr id="74" name="Google Shape;74;p16"/>
+          <p:cNvSpPr txBox="1"/>
+          <p:nvPr/>
+        </p:nvSpPr>
+        <p:spPr>
+          <a:xfrm>
+            <a:off x="237450" y="3621000"/>
+            <a:ext cx="669000" cy="400200"/>
+          </a:xfrm>
+          <a:prstGeom prst="rect">
+            <a:avLst/>
+          </a:prstGeom>
+          <a:noFill/>
+          <a:ln>
+            <a:noFill/>
+          </a:ln>
+        </p:spPr>
+        <p:txBody>
+          <a:bodyPr spcFirstLastPara="1" wrap="square" lIns="91425" tIns="91425" rIns="91425" bIns="91425" anchor="t" anchorCtr="0">
+            <a:spAutoFit/>
+          </a:bodyPr>
+          <a:lstStyle/>
+          <a:p>
+            <a:pPr marL="0" lvl="0" indent="0" algn="r" rtl="0">
+              <a:spcBef>
+                <a:spcPts val="0"/>
+              </a:spcBef>
+              <a:spcAft>
+                <a:spcPts val="0"/>
+              </a:spcAft>
+              <a:buNone/>
+            </a:pPr>
+            <a:r>
+              <a:rPr lang="en"/>
+              <a:t>BAM</a:t>
+            </a:r>
+            <a:endParaRPr/>
+          </a:p>
+        </p:txBody>
+      </p:sp>
+      <p:sp>
+        <p:nvSpPr>
+          <p:cNvPr id="75" name="Google Shape;75;p16"/>
+          <p:cNvSpPr txBox="1"/>
+          <p:nvPr/>
+        </p:nvSpPr>
+        <p:spPr>
+          <a:xfrm>
+            <a:off x="-237450" y="2027450"/>
+            <a:ext cx="1143900" cy="369300"/>
+          </a:xfrm>
+          <a:prstGeom prst="rect">
+            <a:avLst/>
+          </a:prstGeom>
+          <a:noFill/>
+          <a:ln>
+            <a:noFill/>
+          </a:ln>
+        </p:spPr>
+        <p:txBody>
+          <a:bodyPr spcFirstLastPara="1" wrap="square" lIns="91425" tIns="91425" rIns="91425" bIns="91425" anchor="t" anchorCtr="0">
+            <a:spAutoFit/>
+          </a:bodyPr>
+          <a:lstStyle/>
+          <a:p>
+            <a:pPr marL="0" lvl="0" indent="0" algn="r" rtl="0">
+              <a:spcBef>
+                <a:spcPts val="0"/>
+              </a:spcBef>
+              <a:spcAft>
+                <a:spcPts val="0"/>
+              </a:spcAft>
+              <a:buNone/>
+            </a:pPr>
+            <a:r>
+              <a:rPr lang="en" sz="1200"/>
+              <a:t>annotation</a:t>
+            </a:r>
+            <a:endParaRPr sz="1200"/>
+          </a:p>
+        </p:txBody>
+      </p:sp>
+      <p:sp>
+        <p:nvSpPr>
+          <p:cNvPr id="76" name="Google Shape;76;p16"/>
+          <p:cNvSpPr txBox="1">
+            <a:spLocks noGrp="1"/>
+          </p:cNvSpPr>
+          <p:nvPr>
+            <p:ph type="title"/>
+          </p:nvPr>
+        </p:nvSpPr>
+        <p:spPr>
+          <a:xfrm>
+            <a:off x="152400" y="152400"/>
+            <a:ext cx="8520600" cy="572700"/>
+          </a:xfrm>
+          <a:prstGeom prst="rect">
+            <a:avLst/>
+          </a:prstGeom>
+        </p:spPr>
+        <p:txBody>
+          <a:bodyPr spcFirstLastPara="1" wrap="square" lIns="91425" tIns="91425" rIns="91425" bIns="91425" anchor="t" anchorCtr="0">
+            <a:normAutofit fontScale="90000"/>
+          </a:bodyPr>
+          <a:lstStyle/>
+          <a:p>
+            <a:pPr marL="0" lvl="0" indent="0" algn="l" rtl="0">
+              <a:spcBef>
+                <a:spcPts val="0"/>
+              </a:spcBef>
+              <a:spcAft>
+                <a:spcPts val="0"/>
+              </a:spcAft>
+              <a:buNone/>
+            </a:pPr>
+            <a:r>
+              <a:rPr lang="en"/>
+              <a:t>Comparing BAM and TDF files on IGV</a:t>
+            </a:r>
+            <a:endParaRPr/>
+          </a:p>
+        </p:txBody>
+      </p:sp>
+      <p:sp>
+        <p:nvSpPr>
+          <p:cNvPr id="77" name="Google Shape;77;p16"/>
+          <p:cNvSpPr txBox="1"/>
+          <p:nvPr/>
+        </p:nvSpPr>
+        <p:spPr>
+          <a:xfrm>
+            <a:off x="2976000" y="3917675"/>
+            <a:ext cx="1491300" cy="615600"/>
+          </a:xfrm>
+          <a:prstGeom prst="rect">
+            <a:avLst/>
+          </a:prstGeom>
+          <a:noFill/>
+          <a:ln>
+            <a:noFill/>
+          </a:ln>
+        </p:spPr>
+        <p:txBody>
+          <a:bodyPr spcFirstLastPara="1" wrap="square" lIns="91425" tIns="91425" rIns="91425" bIns="91425" anchor="ctr" anchorCtr="0">
+            <a:noAutofit/>
+          </a:bodyPr>
+          <a:lstStyle/>
+          <a:p>
+            <a:pPr marL="0" lvl="0" indent="0" algn="ctr" rtl="0">
+              <a:spcBef>
+                <a:spcPts val="0"/>
+              </a:spcBef>
+              <a:spcAft>
+                <a:spcPts val="0"/>
+              </a:spcAft>
+              <a:buNone/>
+            </a:pPr>
+            <a:r>
+              <a:rPr lang="en"/>
+              <a:t>Individual </a:t>
+            </a:r>
+            <a:endParaRPr/>
+          </a:p>
+          <a:p>
+            <a:pPr marL="0" lvl="0" indent="0" algn="ctr" rtl="0">
+              <a:spcBef>
+                <a:spcPts val="0"/>
+              </a:spcBef>
+              <a:spcAft>
+                <a:spcPts val="0"/>
+              </a:spcAft>
+              <a:buNone/>
+            </a:pPr>
+            <a:r>
+              <a:rPr lang="en"/>
+              <a:t>mapped reads</a:t>
+            </a:r>
+            <a:endParaRPr/>
+          </a:p>
+        </p:txBody>
+      </p:sp>
+      <p:cxnSp>
+        <p:nvCxnSpPr>
+          <p:cNvPr id="78" name="Google Shape;78;p16"/>
+          <p:cNvCxnSpPr/>
+          <p:nvPr/>
+        </p:nvCxnSpPr>
+        <p:spPr>
+          <a:xfrm>
+            <a:off x="2899325" y="3482900"/>
+            <a:ext cx="369300" cy="606300"/>
+          </a:xfrm>
+          <a:prstGeom prst="straightConnector1">
+            <a:avLst/>
+          </a:prstGeom>
+          <a:noFill/>
+          <a:ln w="28575" cap="flat" cmpd="sng">
+            <a:solidFill>
+              <a:schemeClr val="dk1"/>
+            </a:solidFill>
+            <a:prstDash val="solid"/>
+            <a:round/>
+            <a:headEnd type="triangle" w="med" len="med"/>
+            <a:tailEnd type="none" w="med" len="med"/>
+          </a:ln>
+        </p:spPr>
+      </p:cxnSp>
+      <p:cxnSp>
+        <p:nvCxnSpPr>
+          <p:cNvPr id="79" name="Google Shape;79;p16"/>
+          <p:cNvCxnSpPr/>
+          <p:nvPr/>
+        </p:nvCxnSpPr>
+        <p:spPr>
+          <a:xfrm flipH="1">
+            <a:off x="3783425" y="3489875"/>
+            <a:ext cx="49800" cy="427800"/>
+          </a:xfrm>
+          <a:prstGeom prst="straightConnector1">
+            <a:avLst/>
+          </a:prstGeom>
+          <a:noFill/>
+          <a:ln w="28575" cap="flat" cmpd="sng">
+            <a:solidFill>
+              <a:schemeClr val="dk1"/>
+            </a:solidFill>
+            <a:prstDash val="solid"/>
+            <a:round/>
+            <a:headEnd type="triangle" w="med" len="med"/>
+            <a:tailEnd type="none" w="med" len="med"/>
+          </a:ln>
+        </p:spPr>
+      </p:cxnSp>
+      <p:cxnSp>
+        <p:nvCxnSpPr>
+          <p:cNvPr id="80" name="Google Shape;80;p16"/>
+          <p:cNvCxnSpPr/>
+          <p:nvPr/>
+        </p:nvCxnSpPr>
+        <p:spPr>
+          <a:xfrm flipH="1">
+            <a:off x="4221650" y="3928950"/>
+            <a:ext cx="385200" cy="204300"/>
+          </a:xfrm>
+          <a:prstGeom prst="straightConnector1">
+            <a:avLst/>
+          </a:prstGeom>
+          <a:noFill/>
+          <a:ln w="28575" cap="flat" cmpd="sng">
+            <a:solidFill>
+              <a:schemeClr val="dk1"/>
+            </a:solidFill>
+            <a:prstDash val="solid"/>
+            <a:round/>
+            <a:headEnd type="triangle" w="med" len="med"/>
+            <a:tailEnd type="none" w="med" len="med"/>
+          </a:ln>
+        </p:spPr>
+      </p:cxnSp>
+      <p:sp>
+        <p:nvSpPr>
+          <p:cNvPr id="81" name="Google Shape;81;p16"/>
+          <p:cNvSpPr txBox="1"/>
+          <p:nvPr/>
+        </p:nvSpPr>
+        <p:spPr>
+          <a:xfrm>
+            <a:off x="2843937" y="629775"/>
+            <a:ext cx="4223700" cy="615600"/>
+          </a:xfrm>
+          <a:prstGeom prst="rect">
+            <a:avLst/>
+          </a:prstGeom>
+          <a:noFill/>
+          <a:ln>
+            <a:noFill/>
+          </a:ln>
+        </p:spPr>
+        <p:txBody>
+          <a:bodyPr spcFirstLastPara="1" wrap="square" lIns="91425" tIns="91425" rIns="91425" bIns="91425" anchor="b" anchorCtr="0">
+            <a:noAutofit/>
+          </a:bodyPr>
+          <a:lstStyle/>
+          <a:p>
+            <a:pPr marL="0" lvl="0" indent="0" algn="ctr" rtl="0">
+              <a:spcBef>
+                <a:spcPts val="0"/>
+              </a:spcBef>
+              <a:spcAft>
+                <a:spcPts val="0"/>
+              </a:spcAft>
+              <a:buNone/>
+            </a:pPr>
+            <a:r>
+              <a:rPr lang="en" sz="2000"/>
+              <a:t>Observed region on screen = </a:t>
+            </a:r>
+            <a:r>
+              <a:rPr lang="en" sz="2000" b="1"/>
+              <a:t>13 kb</a:t>
+            </a:r>
+            <a:endParaRPr sz="2000" b="1"/>
+          </a:p>
+        </p:txBody>
+      </p:sp>
+      <p:sp>
+        <p:nvSpPr>
+          <p:cNvPr id="82" name="Google Shape;82;p16"/>
+          <p:cNvSpPr txBox="1"/>
+          <p:nvPr/>
+        </p:nvSpPr>
+        <p:spPr>
+          <a:xfrm>
+            <a:off x="237450" y="2276800"/>
+            <a:ext cx="669000" cy="400200"/>
+          </a:xfrm>
+          <a:prstGeom prst="rect">
+            <a:avLst/>
+          </a:prstGeom>
+          <a:noFill/>
+          <a:ln>
+            <a:noFill/>
+          </a:ln>
+        </p:spPr>
+        <p:txBody>
+          <a:bodyPr spcFirstLastPara="1" wrap="square" lIns="91425" tIns="91425" rIns="91425" bIns="91425" anchor="t" anchorCtr="0">
+            <a:spAutoFit/>
+          </a:bodyPr>
+          <a:lstStyle/>
+          <a:p>
+            <a:pPr marL="0" lvl="0" indent="0" algn="r" rtl="0">
+              <a:spcBef>
+                <a:spcPts val="0"/>
+              </a:spcBef>
+              <a:spcAft>
+                <a:spcPts val="0"/>
+              </a:spcAft>
+              <a:buNone/>
+            </a:pPr>
+            <a:r>
+              <a:rPr lang="en"/>
+              <a:t>TDF</a:t>
+            </a:r>
+            <a:endParaRPr/>
+          </a:p>
+        </p:txBody>
+      </p:sp>
+      <p:sp>
+        <p:nvSpPr>
+          <p:cNvPr id="83" name="Google Shape;83;p16"/>
+          <p:cNvSpPr/>
+          <p:nvPr/>
+        </p:nvSpPr>
+        <p:spPr>
+          <a:xfrm>
+            <a:off x="919975" y="2276800"/>
+            <a:ext cx="8071500" cy="441300"/>
+          </a:xfrm>
+          <a:prstGeom prst="rect">
+            <a:avLst/>
+          </a:prstGeom>
+          <a:solidFill>
+            <a:srgbClr val="FFFFFF"/>
+          </a:solidFill>
+          <a:ln>
+            <a:noFill/>
+          </a:ln>
+        </p:spPr>
+        <p:txBody>
+          <a:bodyPr spcFirstLastPara="1" wrap="square" lIns="91425" tIns="91425" rIns="91425" bIns="91425" anchor="ctr" anchorCtr="0">
+            <a:noAutofit/>
+          </a:bodyPr>
+          <a:lstStyle/>
+          <a:p>
+            <a:pPr marL="0" lvl="0" indent="0" algn="l" rtl="0">
+              <a:spcBef>
+                <a:spcPts val="0"/>
+              </a:spcBef>
+              <a:spcAft>
+                <a:spcPts val="0"/>
+              </a:spcAft>
+              <a:buNone/>
+            </a:pPr>
+            <a:endParaRPr/>
+          </a:p>
+        </p:txBody>
+      </p:sp>
+    </p:spTree>
+  </p:cSld>
+  <p:clrMapOvr>
+    <a:masterClrMapping/>
+  </p:clrMapOvr>
+  <p:timing>
+    <p:tnLst>
+      <p:par>
+        <p:cTn id="1" dur="indefinite" restart="never" nodeType="tmRoot">
+          <p:childTnLst>
+            <p:seq concurrent="1" nextAc="seek">
+              <p:cTn id="2" dur="indefinite" nodeType="mainSeq">
+                <p:childTnLst>
+                  <p:par>
+                    <p:cTn id="3" fill="hold">
+                      <p:stCondLst>
+                        <p:cond delay="indefinite"/>
+                      </p:stCondLst>
+                      <p:childTnLst>
+                        <p:par>
+                          <p:cTn id="4" fill="hold">
+                            <p:stCondLst>
+                              <p:cond delay="0"/>
+                            </p:stCondLst>
+                            <p:childTnLst>
+                              <p:par>
+                                <p:cTn id="5" presetID="1" presetClass="entr" presetSubtype="0" fill="hold" nodeType="clickEffect">
+                                  <p:stCondLst>
+                                    <p:cond delay="0"/>
+                                  </p:stCondLst>
+                                  <p:childTnLst>
+                                    <p:set>
+                                      <p:cBhvr>
+                                        <p:cTn id="6" dur="1" fill="hold">
+                                          <p:stCondLst>
+                                            <p:cond delay="0"/>
+                                          </p:stCondLst>
+                                        </p:cTn>
+                                        <p:tgtEl>
+                                          <p:spTgt spid="82"/>
+                                        </p:tgtEl>
+                                        <p:attrNameLst>
+                                          <p:attrName>style.visibility</p:attrName>
+                                        </p:attrNameLst>
+                                      </p:cBhvr>
+                                      <p:to>
+                                        <p:strVal val="visible"/>
+                                      </p:to>
+                                    </p:set>
+                                  </p:childTnLst>
+                                </p:cTn>
+                              </p:par>
+                              <p:par>
+                                <p:cTn id="7" presetID="1" presetClass="exit" presetSubtype="0" fill="hold" nodeType="withEffect">
+                                  <p:stCondLst>
+                                    <p:cond delay="0"/>
+                                  </p:stCondLst>
+                                  <p:childTnLst>
+                                    <p:set>
+                                      <p:cBhvr>
+                                        <p:cTn id="8" dur="1" fill="hold">
+                                          <p:stCondLst>
+                                            <p:cond delay="0"/>
+                                          </p:stCondLst>
+                                        </p:cTn>
+                                        <p:tgtEl>
+                                          <p:spTgt spid="83"/>
+                                        </p:tgtEl>
+                                        <p:attrNameLst>
+                                          <p:attrName>style.visibility</p:attrName>
+                                        </p:attrNameLst>
+                                      </p:cBhvr>
+                                      <p:to>
+                                        <p:strVal val="hidden"/>
+                                      </p:to>
+                                    </p:set>
+                                  </p:childTnLst>
+                                </p:cTn>
+                              </p:par>
+                            </p:childTnLst>
+                          </p:cTn>
+                        </p:par>
+                      </p:childTnLst>
+                    </p:cTn>
+                  </p:par>
+                </p:childTnLst>
+              </p:cTn>
+              <p:prevCondLst>
+                <p:cond evt="onPrev" delay="0">
+                  <p:tgtEl>
+                    <p:sldTgt/>
+                  </p:tgtEl>
+                </p:cond>
+              </p:prevCondLst>
+              <p:nextCondLst>
+                <p:cond evt="onNext" delay="0">
+                  <p:tgtEl>
+                    <p:sldTgt/>
+                  </p:tgtEl>
+                </p:cond>
+              </p:nextCondLst>
+            </p:seq>
+          </p:childTnLst>
+        </p:cTn>
+      </p:par>
+    </p:tnLst>
+  </p:timing>
+</p:sld>
+</file>
+
+<file path=ppt/slides/slide4.xml><?xml version="1.0" encoding="utf-8"?>
+<p:sld xmlns:a="http://schemas.openxmlformats.org/drawingml/2006/main" xmlns:r="http://schemas.openxmlformats.org/officeDocument/2006/relationships" xmlns:p="http://schemas.openxmlformats.org/presentationml/2006/main">
+  <p:cSld>
+    <p:spTree>
+      <p:nvGrpSpPr>
+        <p:cNvPr id="1" name="Shape 87"/>
+        <p:cNvGrpSpPr/>
+        <p:nvPr/>
+      </p:nvGrpSpPr>
+      <p:grpSpPr>
+        <a:xfrm>
+          <a:off x="0" y="0"/>
+          <a:ext cx="0" cy="0"/>
+          <a:chOff x="0" y="0"/>
+          <a:chExt cx="0" cy="0"/>
+        </a:xfrm>
+      </p:grpSpPr>
+      <p:pic>
+        <p:nvPicPr>
+          <p:cNvPr id="88" name="Google Shape;88;p17"/>
+          <p:cNvPicPr preferRelativeResize="0"/>
+          <p:nvPr/>
+        </p:nvPicPr>
+        <p:blipFill>
+          <a:blip r:embed="rId3">
+            <a:alphaModFix/>
+          </a:blip>
+          <a:stretch>
+            <a:fillRect/>
+          </a:stretch>
+        </p:blipFill>
+        <p:spPr>
+          <a:xfrm>
+            <a:off x="929900" y="1645224"/>
+            <a:ext cx="8061699" cy="2005450"/>
+          </a:xfrm>
+          <a:prstGeom prst="rect">
+            <a:avLst/>
+          </a:prstGeom>
+          <a:noFill/>
+          <a:ln w="9525" cap="flat" cmpd="sng">
+            <a:solidFill>
+              <a:schemeClr val="dk1"/>
+            </a:solidFill>
+            <a:prstDash val="solid"/>
+            <a:round/>
+            <a:headEnd type="none" w="sm" len="sm"/>
+            <a:tailEnd type="none" w="sm" len="sm"/>
+          </a:ln>
+        </p:spPr>
+      </p:pic>
+      <p:sp>
+        <p:nvSpPr>
+          <p:cNvPr id="89" name="Google Shape;89;p17"/>
+          <p:cNvSpPr txBox="1"/>
+          <p:nvPr/>
+        </p:nvSpPr>
+        <p:spPr>
+          <a:xfrm>
+            <a:off x="237450" y="3128950"/>
+            <a:ext cx="669000" cy="400200"/>
+          </a:xfrm>
+          <a:prstGeom prst="rect">
+            <a:avLst/>
+          </a:prstGeom>
+          <a:noFill/>
+          <a:ln>
+            <a:noFill/>
+          </a:ln>
+        </p:spPr>
+        <p:txBody>
+          <a:bodyPr spcFirstLastPara="1" wrap="square" lIns="91425" tIns="91425" rIns="91425" bIns="91425" anchor="t" anchorCtr="0">
+            <a:spAutoFit/>
+          </a:bodyPr>
+          <a:lstStyle/>
+          <a:p>
+            <a:pPr marL="0" lvl="0" indent="0" algn="r" rtl="0">
+              <a:spcBef>
+                <a:spcPts val="0"/>
+              </a:spcBef>
+              <a:spcAft>
+                <a:spcPts val="0"/>
+              </a:spcAft>
+              <a:buNone/>
+            </a:pPr>
+            <a:r>
+              <a:rPr lang="en"/>
+              <a:t>BAM</a:t>
+            </a:r>
+            <a:endParaRPr/>
+          </a:p>
+        </p:txBody>
+      </p:sp>
+      <p:sp>
+        <p:nvSpPr>
+          <p:cNvPr id="90" name="Google Shape;90;p17"/>
+          <p:cNvSpPr txBox="1"/>
+          <p:nvPr/>
+        </p:nvSpPr>
+        <p:spPr>
+          <a:xfrm>
+            <a:off x="237450" y="2699150"/>
+            <a:ext cx="669000" cy="400200"/>
+          </a:xfrm>
+          <a:prstGeom prst="rect">
+            <a:avLst/>
+          </a:prstGeom>
+          <a:noFill/>
+          <a:ln>
+            <a:noFill/>
+          </a:ln>
+        </p:spPr>
+        <p:txBody>
+          <a:bodyPr spcFirstLastPara="1" wrap="square" lIns="91425" tIns="91425" rIns="91425" bIns="91425" anchor="t" anchorCtr="0">
+            <a:spAutoFit/>
+          </a:bodyPr>
+          <a:lstStyle/>
+          <a:p>
+            <a:pPr marL="0" lvl="0" indent="0" algn="r" rtl="0">
+              <a:spcBef>
+                <a:spcPts val="0"/>
+              </a:spcBef>
+              <a:spcAft>
+                <a:spcPts val="0"/>
+              </a:spcAft>
+              <a:buNone/>
+            </a:pPr>
+            <a:r>
+              <a:rPr lang="en"/>
+              <a:t>TDF</a:t>
+            </a:r>
+            <a:endParaRPr/>
+          </a:p>
+        </p:txBody>
+      </p:sp>
+      <p:sp>
+        <p:nvSpPr>
+          <p:cNvPr id="91" name="Google Shape;91;p17"/>
+          <p:cNvSpPr txBox="1"/>
+          <p:nvPr/>
+        </p:nvSpPr>
+        <p:spPr>
+          <a:xfrm>
+            <a:off x="-237450" y="2406600"/>
+            <a:ext cx="1143900" cy="369300"/>
+          </a:xfrm>
+          <a:prstGeom prst="rect">
+            <a:avLst/>
+          </a:prstGeom>
+          <a:noFill/>
+          <a:ln>
+            <a:noFill/>
+          </a:ln>
+        </p:spPr>
+        <p:txBody>
+          <a:bodyPr spcFirstLastPara="1" wrap="square" lIns="91425" tIns="91425" rIns="91425" bIns="91425" anchor="t" anchorCtr="0">
+            <a:spAutoFit/>
+          </a:bodyPr>
+          <a:lstStyle/>
+          <a:p>
+            <a:pPr marL="0" lvl="0" indent="0" algn="r" rtl="0">
+              <a:spcBef>
+                <a:spcPts val="0"/>
+              </a:spcBef>
+              <a:spcAft>
+                <a:spcPts val="0"/>
+              </a:spcAft>
+              <a:buNone/>
+            </a:pPr>
+            <a:r>
+              <a:rPr lang="en" sz="1200"/>
+              <a:t>annotation</a:t>
+            </a:r>
+            <a:endParaRPr sz="1200"/>
+          </a:p>
+        </p:txBody>
+      </p:sp>
+      <p:sp>
+        <p:nvSpPr>
+          <p:cNvPr id="92" name="Google Shape;92;p17"/>
+          <p:cNvSpPr txBox="1">
+            <a:spLocks noGrp="1"/>
+          </p:cNvSpPr>
+          <p:nvPr>
+            <p:ph type="title"/>
+          </p:nvPr>
+        </p:nvSpPr>
+        <p:spPr>
+          <a:xfrm>
+            <a:off x="152400" y="152400"/>
+            <a:ext cx="8520600" cy="572700"/>
+          </a:xfrm>
+          <a:prstGeom prst="rect">
+            <a:avLst/>
+          </a:prstGeom>
+        </p:spPr>
+        <p:txBody>
+          <a:bodyPr spcFirstLastPara="1" wrap="square" lIns="91425" tIns="91425" rIns="91425" bIns="91425" anchor="t" anchorCtr="0">
+            <a:normAutofit fontScale="90000"/>
+          </a:bodyPr>
+          <a:lstStyle/>
+          <a:p>
+            <a:pPr marL="0" lvl="0" indent="0" algn="l" rtl="0">
+              <a:spcBef>
+                <a:spcPts val="0"/>
+              </a:spcBef>
+              <a:spcAft>
+                <a:spcPts val="0"/>
+              </a:spcAft>
+              <a:buNone/>
+            </a:pPr>
+            <a:r>
+              <a:rPr lang="en"/>
+              <a:t>Comparing BAM and TDF files on IGV</a:t>
+            </a:r>
+            <a:endParaRPr/>
+          </a:p>
+        </p:txBody>
+      </p:sp>
+      <p:sp>
+        <p:nvSpPr>
+          <p:cNvPr id="93" name="Google Shape;93;p17"/>
+          <p:cNvSpPr txBox="1"/>
+          <p:nvPr/>
+        </p:nvSpPr>
+        <p:spPr>
+          <a:xfrm>
+            <a:off x="2785450" y="1029625"/>
+            <a:ext cx="4350600" cy="615600"/>
+          </a:xfrm>
+          <a:prstGeom prst="rect">
+            <a:avLst/>
+          </a:prstGeom>
+          <a:noFill/>
+          <a:ln>
+            <a:noFill/>
+          </a:ln>
+        </p:spPr>
+        <p:txBody>
+          <a:bodyPr spcFirstLastPara="1" wrap="square" lIns="91425" tIns="91425" rIns="91425" bIns="91425" anchor="b" anchorCtr="0">
+            <a:noAutofit/>
+          </a:bodyPr>
+          <a:lstStyle/>
+          <a:p>
+            <a:pPr marL="0" lvl="0" indent="0" algn="ctr" rtl="0">
+              <a:spcBef>
+                <a:spcPts val="0"/>
+              </a:spcBef>
+              <a:spcAft>
+                <a:spcPts val="0"/>
+              </a:spcAft>
+              <a:buNone/>
+            </a:pPr>
+            <a:r>
+              <a:rPr lang="en" sz="2000"/>
+              <a:t>Observed region on screen = </a:t>
+            </a:r>
+            <a:r>
+              <a:rPr lang="en" sz="2000" b="1"/>
+              <a:t>214 kb</a:t>
+            </a:r>
+            <a:endParaRPr sz="2000" b="1"/>
+          </a:p>
+        </p:txBody>
+      </p:sp>
+      <p:sp>
+        <p:nvSpPr>
+          <p:cNvPr id="94" name="Google Shape;94;p17"/>
+          <p:cNvSpPr txBox="1"/>
+          <p:nvPr/>
+        </p:nvSpPr>
+        <p:spPr>
+          <a:xfrm>
+            <a:off x="1752550" y="3778700"/>
+            <a:ext cx="6416400" cy="947100"/>
+          </a:xfrm>
+          <a:prstGeom prst="rect">
+            <a:avLst/>
+          </a:prstGeom>
+          <a:noFill/>
+          <a:ln>
+            <a:noFill/>
+          </a:ln>
+        </p:spPr>
+        <p:txBody>
+          <a:bodyPr spcFirstLastPara="1" wrap="square" lIns="91425" tIns="91425" rIns="91425" bIns="91425" anchor="ctr" anchorCtr="0">
+            <a:noAutofit/>
+          </a:bodyPr>
+          <a:lstStyle/>
+          <a:p>
+            <a:pPr marL="0" lvl="0" indent="0" algn="ctr" rtl="0">
+              <a:spcBef>
+                <a:spcPts val="0"/>
+              </a:spcBef>
+              <a:spcAft>
+                <a:spcPts val="0"/>
+              </a:spcAft>
+              <a:buNone/>
+            </a:pPr>
+            <a:r>
+              <a:rPr lang="en"/>
+              <a:t>IGV does not display individually mapped reads on such a big region at once!</a:t>
+            </a:r>
+            <a:endParaRPr/>
+          </a:p>
+          <a:p>
+            <a:pPr marL="0" lvl="0" indent="0" algn="ctr" rtl="0">
+              <a:spcBef>
+                <a:spcPts val="0"/>
+              </a:spcBef>
+              <a:spcAft>
+                <a:spcPts val="0"/>
+              </a:spcAft>
+              <a:buNone/>
+            </a:pPr>
+            <a:endParaRPr/>
+          </a:p>
+          <a:p>
+            <a:pPr marL="0" lvl="0" indent="0" algn="ctr" rtl="0">
+              <a:spcBef>
+                <a:spcPts val="0"/>
+              </a:spcBef>
+              <a:spcAft>
+                <a:spcPts val="0"/>
+              </a:spcAft>
+              <a:buNone/>
+            </a:pPr>
+            <a:r>
+              <a:rPr lang="en"/>
+              <a:t>But IGV does okay displaying TDF coverage across any zoom region.</a:t>
+            </a:r>
+            <a:endParaRPr/>
+          </a:p>
+        </p:txBody>
+      </p:sp>
+      <p:sp>
+        <p:nvSpPr>
+          <p:cNvPr id="95" name="Google Shape;95;p17"/>
+          <p:cNvSpPr/>
+          <p:nvPr/>
+        </p:nvSpPr>
+        <p:spPr>
+          <a:xfrm>
+            <a:off x="929900" y="2678600"/>
+            <a:ext cx="8056500" cy="441300"/>
+          </a:xfrm>
+          <a:prstGeom prst="rect">
+            <a:avLst/>
+          </a:prstGeom>
+          <a:solidFill>
+            <a:srgbClr val="FFFFFF"/>
+          </a:solidFill>
+          <a:ln>
+            <a:noFill/>
+          </a:ln>
+        </p:spPr>
+        <p:txBody>
+          <a:bodyPr spcFirstLastPara="1" wrap="square" lIns="91425" tIns="91425" rIns="91425" bIns="91425" anchor="ctr" anchorCtr="0">
+            <a:noAutofit/>
+          </a:bodyPr>
+          <a:lstStyle/>
+          <a:p>
+            <a:pPr marL="0" lvl="0" indent="0" algn="l" rtl="0">
+              <a:spcBef>
+                <a:spcPts val="0"/>
+              </a:spcBef>
+              <a:spcAft>
+                <a:spcPts val="0"/>
+              </a:spcAft>
+              <a:buNone/>
+            </a:pPr>
+            <a:endParaRPr/>
+          </a:p>
+        </p:txBody>
+      </p:sp>
+      <p:pic>
+        <p:nvPicPr>
+          <p:cNvPr id="96" name="Google Shape;96;p17"/>
+          <p:cNvPicPr preferRelativeResize="0"/>
+          <p:nvPr/>
+        </p:nvPicPr>
+        <p:blipFill rotWithShape="1">
+          <a:blip r:embed="rId3">
+            <a:alphaModFix/>
+          </a:blip>
+          <a:srcRect l="49032" t="74266" r="39569" b="17188"/>
+          <a:stretch/>
+        </p:blipFill>
+        <p:spPr>
+          <a:xfrm>
+            <a:off x="4168600" y="3108400"/>
+            <a:ext cx="2366276" cy="441300"/>
+          </a:xfrm>
+          <a:prstGeom prst="rect">
+            <a:avLst/>
+          </a:prstGeom>
+          <a:noFill/>
+          <a:ln>
+            <a:noFill/>
+          </a:ln>
+        </p:spPr>
+      </p:pic>
+    </p:spTree>
+  </p:cSld>
+  <p:clrMapOvr>
+    <a:masterClrMapping/>
+  </p:clrMapOvr>
+  <p:timing>
+    <p:tnLst>
+      <p:par>
+        <p:cTn id="1" dur="indefinite" restart="never" nodeType="tmRoot">
+          <p:childTnLst>
+            <p:seq concurrent="1" nextAc="seek">
+              <p:cTn id="2" dur="indefinite" nodeType="mainSeq">
+                <p:childTnLst>
+                  <p:par>
+                    <p:cTn id="3" fill="hold">
+                      <p:stCondLst>
+                        <p:cond delay="indefinite"/>
+                      </p:stCondLst>
+                      <p:childTnLst>
+                        <p:par>
+                          <p:cTn id="4" fill="hold">
+                            <p:stCondLst>
+                              <p:cond delay="0"/>
+                            </p:stCondLst>
+                            <p:childTnLst>
+                              <p:par>
+                                <p:cTn id="5" presetID="1" presetClass="entr" presetSubtype="0" fill="hold" nodeType="clickEffect">
+                                  <p:stCondLst>
+                                    <p:cond delay="0"/>
+                                  </p:stCondLst>
+                                  <p:childTnLst>
+                                    <p:set>
+                                      <p:cBhvr>
+                                        <p:cTn id="6" dur="1" fill="hold">
+                                          <p:stCondLst>
+                                            <p:cond delay="0"/>
+                                          </p:stCondLst>
+                                        </p:cTn>
+                                        <p:tgtEl>
+                                          <p:spTgt spid="90"/>
+                                        </p:tgtEl>
+                                        <p:attrNameLst>
+                                          <p:attrName>style.visibility</p:attrName>
+                                        </p:attrNameLst>
+                                      </p:cBhvr>
+                                      <p:to>
+                                        <p:strVal val="visible"/>
+                                      </p:to>
+                                    </p:set>
+                                  </p:childTnLst>
+                                </p:cTn>
+                              </p:par>
+                              <p:par>
+                                <p:cTn id="7" presetID="1" presetClass="exit" presetSubtype="0" fill="hold" nodeType="withEffect">
+                                  <p:stCondLst>
+                                    <p:cond delay="0"/>
+                                  </p:stCondLst>
+                                  <p:childTnLst>
+                                    <p:set>
+                                      <p:cBhvr>
+                                        <p:cTn id="8" dur="1" fill="hold">
+                                          <p:stCondLst>
+                                            <p:cond delay="0"/>
+                                          </p:stCondLst>
+                                        </p:cTn>
+                                        <p:tgtEl>
+                                          <p:spTgt spid="95"/>
+                                        </p:tgtEl>
+                                        <p:attrNameLst>
+                                          <p:attrName>style.visibility</p:attrName>
+                                        </p:attrNameLst>
+                                      </p:cBhvr>
+                                      <p:to>
+                                        <p:strVal val="hidden"/>
+                                      </p:to>
+                                    </p:set>
+                                  </p:childTnLst>
+                                </p:cTn>
+                              </p:par>
+                            </p:childTnLst>
+                          </p:cTn>
+                        </p:par>
+                      </p:childTnLst>
+                    </p:cTn>
+                  </p:par>
+                </p:childTnLst>
+              </p:cTn>
+              <p:prevCondLst>
+                <p:cond evt="onPrev" delay="0">
+                  <p:tgtEl>
+                    <p:sldTgt/>
+                  </p:tgtEl>
+                </p:cond>
+              </p:prevCondLst>
+              <p:nextCondLst>
+                <p:cond evt="onNext" delay="0">
+                  <p:tgtEl>
+                    <p:sldTgt/>
+                  </p:tgtEl>
+                </p:cond>
+              </p:nextCondLst>
+            </p:seq>
+          </p:childTnLst>
+        </p:cTn>
+      </p:par>
+    </p:tnLst>
+  </p:timing>
+</p:sld>
+</file>
+
+<file path=ppt/slides/slide5.xml><?xml version="1.0" encoding="utf-8"?>
+<p:sld xmlns:a="http://schemas.openxmlformats.org/drawingml/2006/main" xmlns:r="http://schemas.openxmlformats.org/officeDocument/2006/relationships" xmlns:p="http://schemas.openxmlformats.org/presentationml/2006/main">
+  <p:cSld>
+    <p:spTree>
+      <p:nvGrpSpPr>
+        <p:cNvPr id="1" name=""/>
+        <p:cNvGrpSpPr/>
+        <p:nvPr/>
+      </p:nvGrpSpPr>
+      <p:grpSpPr>
+        <a:xfrm>
+          <a:off x="0" y="0"/>
+          <a:ext cx="0" cy="0"/>
+          <a:chOff x="0" y="0"/>
+          <a:chExt cx="0" cy="0"/>
+        </a:xfrm>
+      </p:grpSpPr>
+      <p:sp>
+        <p:nvSpPr>
+          <p:cNvPr id="2" name="Title 1">
+            <a:extLst>
+              <a:ext uri="{FF2B5EF4-FFF2-40B4-BE49-F238E27FC236}">
+                <a16:creationId xmlns:a16="http://schemas.microsoft.com/office/drawing/2014/main" id="{23F8E540-B840-533C-ADEC-11947EECABA5}"/>
+              </a:ext>
+            </a:extLst>
+          </p:cNvPr>
+          <p:cNvSpPr>
+            <a:spLocks noGrp="1"/>
+          </p:cNvSpPr>
+          <p:nvPr>
+            <p:ph type="title"/>
+          </p:nvPr>
+        </p:nvSpPr>
+        <p:spPr>
+          <a:xfrm>
+            <a:off x="311700" y="1915607"/>
+            <a:ext cx="8520600" cy="572700"/>
+          </a:xfrm>
+        </p:spPr>
+        <p:txBody>
+          <a:bodyPr>
+            <a:noAutofit/>
+          </a:bodyPr>
+          <a:lstStyle/>
+          <a:p>
+            <a:pPr algn="ctr"/>
+            <a:r>
+              <a:rPr lang="en-US" sz="3600" dirty="0"/>
+              <a:t>Go to the Day5 worksheet on </a:t>
+            </a:r>
+            <a:r>
+              <a:rPr lang="en-US" sz="3600" dirty="0" err="1"/>
+              <a:t>Github</a:t>
+            </a:r>
+            <a:r>
+              <a:rPr lang="en-US" sz="3600" dirty="0"/>
+              <a:t>, and get started on today’s exercise</a:t>
+            </a:r>
+          </a:p>
+        </p:txBody>
+      </p:sp>
+    </p:spTree>
+    <p:extLst>
+      <p:ext uri="{BB962C8B-B14F-4D97-AF65-F5344CB8AC3E}">
+        <p14:creationId xmlns:p14="http://schemas.microsoft.com/office/powerpoint/2010/main" val="1823250462"/>
+      </p:ext>
+    </p:extLst>
+  </p:cSld>
+  <p:clrMapOvr>
+    <a:masterClrMapping/>
+  </p:clrMapOvr>
+</p:sld>
+</file>
+
+<file path=ppt/slides/slide6.xml><?xml version="1.0" encoding="utf-8"?>
 <p:sld xmlns:a="http://schemas.openxmlformats.org/drawingml/2006/main" xmlns:r="http://schemas.openxmlformats.org/officeDocument/2006/relationships" xmlns:p="http://schemas.openxmlformats.org/presentationml/2006/main">
   <p:cSld>
     <p:spTree>
@@ -7329,7 +8666,7 @@
           <a:p>
             <a:r>
               <a:rPr lang="en-US" sz="2000" dirty="0"/>
-              <a:t>But for each FASTQ file, I’ll need to edit all of my variable names and submit the jobs individually! Who has that kind of time?!  </a:t>
+              <a:t>But for each FASTQ file, I’ll need to edit all of my variable names and submit the jobs individually!</a:t>
             </a:r>
           </a:p>
         </p:txBody>
@@ -7428,7 +8765,7 @@
 </p:sld>
 </file>
 
-<file path=ppt/slides/slide4.xml><?xml version="1.0" encoding="utf-8"?>
+<file path=ppt/slides/slide7.xml><?xml version="1.0" encoding="utf-8"?>
 <p:sld xmlns:a="http://schemas.openxmlformats.org/drawingml/2006/main" xmlns:r="http://schemas.openxmlformats.org/officeDocument/2006/relationships" xmlns:p="http://schemas.openxmlformats.org/presentationml/2006/main">
   <p:cSld>
     <p:spTree>
@@ -7795,7 +9132,7 @@
         <p:spPr>
           <a:xfrm>
             <a:off x="499621" y="1620122"/>
-            <a:ext cx="5336717" cy="707886"/>
+            <a:ext cx="5192447" cy="707886"/>
           </a:xfrm>
           <a:prstGeom prst="rect">
             <a:avLst/>
@@ -7810,11 +9147,11 @@
           <a:p>
             <a:r>
               <a:rPr lang="en-US" sz="2000" dirty="0"/>
-              <a:t>For every dataset in (</a:t>
+              <a:t>For every dataset in (my/directory/of/</a:t>
             </a:r>
             <a:r>
               <a:rPr lang="en-US" sz="2000" dirty="0" err="1"/>
-              <a:t>my_directory_of_fastqs</a:t>
+              <a:t>fastqs</a:t>
             </a:r>
             <a:r>
               <a:rPr lang="en-US" sz="2000" dirty="0"/>
@@ -7912,73 +9249,7 @@
 </p:sld>
 </file>
 
-<file path=ppt/slides/slide5.xml><?xml version="1.0" encoding="utf-8"?>
-<p:sld xmlns:a="http://schemas.openxmlformats.org/drawingml/2006/main" xmlns:r="http://schemas.openxmlformats.org/officeDocument/2006/relationships" xmlns:p="http://schemas.openxmlformats.org/presentationml/2006/main">
-  <p:cSld>
-    <p:spTree>
-      <p:nvGrpSpPr>
-        <p:cNvPr id="1" name=""/>
-        <p:cNvGrpSpPr/>
-        <p:nvPr/>
-      </p:nvGrpSpPr>
-      <p:grpSpPr>
-        <a:xfrm>
-          <a:off x="0" y="0"/>
-          <a:ext cx="0" cy="0"/>
-          <a:chOff x="0" y="0"/>
-          <a:chExt cx="0" cy="0"/>
-        </a:xfrm>
-      </p:grpSpPr>
-      <p:sp>
-        <p:nvSpPr>
-          <p:cNvPr id="2" name="Title 1">
-            <a:extLst>
-              <a:ext uri="{FF2B5EF4-FFF2-40B4-BE49-F238E27FC236}">
-                <a16:creationId xmlns:a16="http://schemas.microsoft.com/office/drawing/2014/main" id="{23F8E540-B840-533C-ADEC-11947EECABA5}"/>
-              </a:ext>
-            </a:extLst>
-          </p:cNvPr>
-          <p:cNvSpPr>
-            <a:spLocks noGrp="1"/>
-          </p:cNvSpPr>
-          <p:nvPr>
-            <p:ph type="title"/>
-          </p:nvPr>
-        </p:nvSpPr>
-        <p:spPr>
-          <a:xfrm>
-            <a:off x="311700" y="1915607"/>
-            <a:ext cx="8520600" cy="572700"/>
-          </a:xfrm>
-        </p:spPr>
-        <p:txBody>
-          <a:bodyPr>
-            <a:noAutofit/>
-          </a:bodyPr>
-          <a:lstStyle/>
-          <a:p>
-            <a:pPr algn="ctr"/>
-            <a:r>
-              <a:rPr lang="en-US" sz="3600" dirty="0"/>
-              <a:t>Go to the Day5 worksheet, and get started on today’s exercise</a:t>
-            </a:r>
-          </a:p>
-        </p:txBody>
-      </p:sp>
-    </p:spTree>
-    <p:extLst>
-      <p:ext uri="{BB962C8B-B14F-4D97-AF65-F5344CB8AC3E}">
-        <p14:creationId xmlns:p14="http://schemas.microsoft.com/office/powerpoint/2010/main" val="1823250462"/>
-      </p:ext>
-    </p:extLst>
-  </p:cSld>
-  <p:clrMapOvr>
-    <a:masterClrMapping/>
-  </p:clrMapOvr>
-</p:sld>
-</file>
-
-<file path=ppt/slides/slide6.xml><?xml version="1.0" encoding="utf-8"?>
+<file path=ppt/slides/slide8.xml><?xml version="1.0" encoding="utf-8"?>
 <p:sld xmlns:a="http://schemas.openxmlformats.org/drawingml/2006/main" xmlns:r="http://schemas.openxmlformats.org/officeDocument/2006/relationships" xmlns:p="http://schemas.openxmlformats.org/presentationml/2006/main">
   <p:cSld>
     <p:spTree>
@@ -8044,7 +9315,7 @@
 </p:sld>
 </file>
 
-<file path=ppt/slides/slide7.xml><?xml version="1.0" encoding="utf-8"?>
+<file path=ppt/slides/slide9.xml><?xml version="1.0" encoding="utf-8"?>
 <p:sld xmlns:a="http://schemas.openxmlformats.org/drawingml/2006/main" xmlns:r="http://schemas.openxmlformats.org/officeDocument/2006/relationships" xmlns:p="http://schemas.openxmlformats.org/presentationml/2006/main">
   <p:cSld>
     <p:spTree>

</xml_diff>

<commit_message>
added visualization of the for loops
Former-commit-id: e99d4dbb191e588413e361a223b609af6f1739d9
</commit_message>
<xml_diff>
--- a/day05/slides/Day5_slides.pptx
+++ b/day05/slides/Day5_slides.pptx
@@ -5,7 +5,7 @@
     <p:sldMasterId id="2147483659" r:id="rId1"/>
   </p:sldMasterIdLst>
   <p:notesMasterIdLst>
-    <p:notesMasterId r:id="rId11"/>
+    <p:notesMasterId r:id="rId12"/>
   </p:notesMasterIdLst>
   <p:sldIdLst>
     <p:sldId id="256" r:id="rId2"/>
@@ -14,26 +14,27 @@
     <p:sldId id="260" r:id="rId5"/>
     <p:sldId id="270" r:id="rId6"/>
     <p:sldId id="263" r:id="rId7"/>
-    <p:sldId id="269" r:id="rId8"/>
-    <p:sldId id="267" r:id="rId9"/>
-    <p:sldId id="266" r:id="rId10"/>
+    <p:sldId id="271" r:id="rId8"/>
+    <p:sldId id="269" r:id="rId9"/>
+    <p:sldId id="267" r:id="rId10"/>
+    <p:sldId id="266" r:id="rId11"/>
   </p:sldIdLst>
   <p:sldSz cx="9144000" cy="5143500" type="screen16x9"/>
   <p:notesSz cx="6858000" cy="9144000"/>
   <p:embeddedFontLst>
     <p:embeddedFont>
       <p:font typeface="Calibri" panose="020F0502020204030204" pitchFamily="34" charset="0"/>
-      <p:regular r:id="rId12"/>
-      <p:bold r:id="rId13"/>
-      <p:italic r:id="rId14"/>
-      <p:boldItalic r:id="rId15"/>
+      <p:regular r:id="rId13"/>
+      <p:bold r:id="rId14"/>
+      <p:italic r:id="rId15"/>
+      <p:boldItalic r:id="rId16"/>
     </p:embeddedFont>
     <p:embeddedFont>
       <p:font typeface="Helvetica Neue" panose="02000503000000020004" pitchFamily="2" charset="0"/>
-      <p:regular r:id="rId16"/>
-      <p:bold r:id="rId17"/>
-      <p:italic r:id="rId18"/>
-      <p:boldItalic r:id="rId19"/>
+      <p:regular r:id="rId17"/>
+      <p:bold r:id="rId18"/>
+      <p:italic r:id="rId19"/>
+      <p:boldItalic r:id="rId20"/>
     </p:embeddedFont>
   </p:embeddedFontLst>
   <p:defaultTextStyle>
@@ -1066,7 +1067,7 @@
         </p:nvSpPr>
         <p:spPr>
           <a:xfrm>
-            <a:off x="381300" y="685800"/>
+            <a:off x="381000" y="685800"/>
             <a:ext cx="6096000" cy="3429000"/>
           </a:xfrm>
           <a:custGeom>
@@ -6517,6 +6518,231 @@
 </p:sld>
 </file>
 
+<file path=ppt/slides/slide10.xml><?xml version="1.0" encoding="utf-8"?>
+<p:sld xmlns:a="http://schemas.openxmlformats.org/drawingml/2006/main" xmlns:r="http://schemas.openxmlformats.org/officeDocument/2006/relationships" xmlns:p="http://schemas.openxmlformats.org/presentationml/2006/main">
+  <p:cSld>
+    <p:spTree>
+      <p:nvGrpSpPr>
+        <p:cNvPr id="1" name="Shape 166"/>
+        <p:cNvGrpSpPr/>
+        <p:nvPr/>
+      </p:nvGrpSpPr>
+      <p:grpSpPr>
+        <a:xfrm>
+          <a:off x="0" y="0"/>
+          <a:ext cx="0" cy="0"/>
+          <a:chOff x="0" y="0"/>
+          <a:chExt cx="0" cy="0"/>
+        </a:xfrm>
+      </p:grpSpPr>
+      <p:sp>
+        <p:nvSpPr>
+          <p:cNvPr id="167" name="Google Shape;167;p23"/>
+          <p:cNvSpPr txBox="1">
+            <a:spLocks noGrp="1"/>
+          </p:cNvSpPr>
+          <p:nvPr>
+            <p:ph type="title"/>
+          </p:nvPr>
+        </p:nvSpPr>
+        <p:spPr>
+          <a:xfrm>
+            <a:off x="212100" y="168750"/>
+            <a:ext cx="8719800" cy="4806000"/>
+          </a:xfrm>
+          <a:prstGeom prst="rect">
+            <a:avLst/>
+          </a:prstGeom>
+        </p:spPr>
+        <p:txBody>
+          <a:bodyPr spcFirstLastPara="1" wrap="square" lIns="91425" tIns="91425" rIns="91425" bIns="91425" anchor="ctr" anchorCtr="0">
+            <a:normAutofit/>
+          </a:bodyPr>
+          <a:lstStyle/>
+          <a:p>
+            <a:pPr marL="0" lvl="0" indent="0" algn="ctr" rtl="0">
+              <a:spcBef>
+                <a:spcPts val="0"/>
+              </a:spcBef>
+              <a:spcAft>
+                <a:spcPts val="0"/>
+              </a:spcAft>
+              <a:buNone/>
+            </a:pPr>
+            <a:r>
+              <a:rPr lang="en" dirty="0"/>
+              <a:t>Check out the other FASTQ datasets in Day5.</a:t>
+            </a:r>
+            <a:br>
+              <a:rPr lang="en" dirty="0"/>
+            </a:br>
+            <a:br>
+              <a:rPr lang="en-US" dirty="0"/>
+            </a:br>
+            <a:r>
+              <a:rPr lang="en-US" dirty="0"/>
+              <a:t>Imagine these files are fresh off the sequencer… can you write your own scripts to turn them from raw FASTQs to TDFs? What QC checks should you perform?</a:t>
+            </a:r>
+            <a:endParaRPr dirty="0"/>
+          </a:p>
+          <a:p>
+            <a:pPr marL="0" lvl="0" indent="0" algn="ctr" rtl="0">
+              <a:spcBef>
+                <a:spcPts val="0"/>
+              </a:spcBef>
+              <a:spcAft>
+                <a:spcPts val="0"/>
+              </a:spcAft>
+              <a:buNone/>
+            </a:pPr>
+            <a:endParaRPr dirty="0"/>
+          </a:p>
+          <a:p>
+            <a:pPr marL="0" lvl="0" indent="0" algn="ctr" rtl="0">
+              <a:spcBef>
+                <a:spcPts val="0"/>
+              </a:spcBef>
+              <a:spcAft>
+                <a:spcPts val="0"/>
+              </a:spcAft>
+              <a:buNone/>
+            </a:pPr>
+            <a:r>
+              <a:rPr lang="en" sz="2244" dirty="0"/>
+              <a:t>(Extra-very-real-points: Do all files with a loop!)</a:t>
+            </a:r>
+            <a:endParaRPr sz="2244" dirty="0"/>
+          </a:p>
+          <a:p>
+            <a:pPr marL="0" lvl="0" indent="0" algn="ctr" rtl="0">
+              <a:spcBef>
+                <a:spcPts val="0"/>
+              </a:spcBef>
+              <a:spcAft>
+                <a:spcPts val="0"/>
+              </a:spcAft>
+              <a:buNone/>
+            </a:pPr>
+            <a:endParaRPr dirty="0"/>
+          </a:p>
+          <a:p>
+            <a:pPr marL="0" lvl="0" indent="0" algn="ctr" rtl="0">
+              <a:spcBef>
+                <a:spcPts val="0"/>
+              </a:spcBef>
+              <a:spcAft>
+                <a:spcPts val="0"/>
+              </a:spcAft>
+              <a:buNone/>
+            </a:pPr>
+            <a:r>
+              <a:rPr lang="en" dirty="0">
+                <a:solidFill>
+                  <a:srgbClr val="000000"/>
+                </a:solidFill>
+              </a:rPr>
+              <a:t>          FASTQ</a:t>
+            </a:r>
+            <a:r>
+              <a:rPr lang="en" dirty="0"/>
+              <a:t> ➡ SAM ➡ BAM ➡</a:t>
+            </a:r>
+            <a:endParaRPr dirty="0"/>
+          </a:p>
+          <a:p>
+            <a:pPr marL="0" lvl="0" indent="0" algn="ctr" rtl="0">
+              <a:spcBef>
+                <a:spcPts val="0"/>
+              </a:spcBef>
+              <a:spcAft>
+                <a:spcPts val="0"/>
+              </a:spcAft>
+              <a:buNone/>
+            </a:pPr>
+            <a:r>
+              <a:rPr lang="en" dirty="0"/>
+              <a:t> ➡ BEDGRAPH ➡ TDF    </a:t>
+            </a:r>
+            <a:r>
+              <a:rPr lang="en" dirty="0">
+                <a:solidFill>
+                  <a:srgbClr val="FFFFFF"/>
+                </a:solidFill>
+              </a:rPr>
+              <a:t>F</a:t>
+            </a:r>
+            <a:r>
+              <a:rPr lang="en" dirty="0"/>
+              <a:t>   </a:t>
+            </a:r>
+            <a:endParaRPr dirty="0"/>
+          </a:p>
+        </p:txBody>
+      </p:sp>
+      <p:pic>
+        <p:nvPicPr>
+          <p:cNvPr id="168" name="Google Shape;168;p23"/>
+          <p:cNvPicPr preferRelativeResize="0"/>
+          <p:nvPr/>
+        </p:nvPicPr>
+        <p:blipFill>
+          <a:blip r:embed="rId3">
+            <a:alphaModFix/>
+          </a:blip>
+          <a:stretch>
+            <a:fillRect/>
+          </a:stretch>
+        </p:blipFill>
+        <p:spPr>
+          <a:xfrm>
+            <a:off x="2164208" y="3831559"/>
+            <a:ext cx="684650" cy="443625"/>
+          </a:xfrm>
+          <a:prstGeom prst="rect">
+            <a:avLst/>
+          </a:prstGeom>
+          <a:noFill/>
+          <a:ln>
+            <a:noFill/>
+          </a:ln>
+        </p:spPr>
+      </p:pic>
+      <p:pic>
+        <p:nvPicPr>
+          <p:cNvPr id="169" name="Google Shape;169;p23"/>
+          <p:cNvPicPr preferRelativeResize="0"/>
+          <p:nvPr/>
+        </p:nvPicPr>
+        <p:blipFill>
+          <a:blip r:embed="rId4">
+            <a:alphaModFix/>
+          </a:blip>
+          <a:stretch>
+            <a:fillRect/>
+          </a:stretch>
+        </p:blipFill>
+        <p:spPr>
+          <a:xfrm>
+            <a:off x="6287167" y="4454294"/>
+            <a:ext cx="711478" cy="443625"/>
+          </a:xfrm>
+          <a:prstGeom prst="rect">
+            <a:avLst/>
+          </a:prstGeom>
+          <a:noFill/>
+          <a:ln>
+            <a:noFill/>
+          </a:ln>
+        </p:spPr>
+      </p:pic>
+    </p:spTree>
+  </p:cSld>
+  <p:clrMapOvr>
+    <a:masterClrMapping/>
+  </p:clrMapOvr>
+</p:sld>
+</file>
+
 <file path=ppt/slides/slide2.xml><?xml version="1.0" encoding="utf-8"?>
 <p:sld xmlns:a="http://schemas.openxmlformats.org/drawingml/2006/main" xmlns:r="http://schemas.openxmlformats.org/officeDocument/2006/relationships" xmlns:p="http://schemas.openxmlformats.org/presentationml/2006/main">
   <p:cSld>
@@ -6589,7 +6815,7 @@
         <p:spPr>
           <a:xfrm>
             <a:off x="311700" y="1229550"/>
-            <a:ext cx="8520600" cy="3294000"/>
+            <a:ext cx="8722572" cy="3294000"/>
           </a:xfrm>
           <a:prstGeom prst="rect">
             <a:avLst/>
@@ -6601,7 +6827,7 @@
           </a:bodyPr>
           <a:lstStyle/>
           <a:p>
-            <a:pPr marL="457200" lvl="0" indent="-344043" algn="l" rtl="0">
+            <a:pPr marL="113157" lvl="0" algn="l" rtl="0">
               <a:lnSpc>
                 <a:spcPct val="100000"/>
               </a:lnSpc>
@@ -6612,55 +6838,33 @@
                 <a:spcPts val="0"/>
               </a:spcAft>
               <a:buSzPct val="100000"/>
-              <a:buChar char="-"/>
             </a:pPr>
             <a:r>
               <a:rPr lang="en" sz="2020" dirty="0"/>
-              <a:t>Working on a </a:t>
+              <a:t>- Working on a </a:t>
             </a:r>
             <a:r>
-              <a:rPr lang="en" sz="2020" dirty="0" err="1"/>
+              <a:rPr lang="en" sz="2020" b="1" dirty="0" err="1"/>
               <a:t>unix</a:t>
             </a:r>
             <a:r>
+              <a:rPr lang="en" sz="2020" b="1" dirty="0"/>
+              <a:t>-like command terminal</a:t>
+            </a:r>
+            <a:br>
               <a:rPr lang="en" sz="2020" dirty="0"/>
-              <a:t>-like command terminal.</a:t>
-            </a:r>
-            <a:endParaRPr sz="2020" dirty="0"/>
-          </a:p>
-          <a:p>
-            <a:pPr marL="0" lvl="0" indent="0" algn="l" rtl="0">
-              <a:lnSpc>
-                <a:spcPct val="100000"/>
-              </a:lnSpc>
-              <a:spcBef>
-                <a:spcPts val="0"/>
-              </a:spcBef>
-              <a:spcAft>
-                <a:spcPts val="0"/>
-              </a:spcAft>
-              <a:buSzPct val="49009"/>
-              <a:buNone/>
-            </a:pPr>
-            <a:endParaRPr sz="2020" dirty="0"/>
-          </a:p>
-          <a:p>
-            <a:pPr marL="457200" lvl="0" indent="-344043" algn="l" rtl="0">
-              <a:lnSpc>
-                <a:spcPct val="100000"/>
-              </a:lnSpc>
-              <a:spcBef>
-                <a:spcPts val="0"/>
-              </a:spcBef>
-              <a:spcAft>
-                <a:spcPts val="0"/>
-              </a:spcAft>
-              <a:buSzPct val="100000"/>
-              <a:buChar char="-"/>
-            </a:pPr>
+            </a:br>
             <a:r>
               <a:rPr lang="en" sz="2020" dirty="0"/>
-              <a:t>Connecting to computer cluster (AWS or </a:t>
+              <a:t>- Connecting to </a:t>
+            </a:r>
+            <a:r>
+              <a:rPr lang="en" sz="2020" b="1" dirty="0"/>
+              <a:t>computer cluster </a:t>
+            </a:r>
+            <a:r>
+              <a:rPr lang="en" sz="2020" dirty="0"/>
+              <a:t>(AWS or </a:t>
             </a:r>
             <a:r>
               <a:rPr lang="en" sz="2020" dirty="0" err="1"/>
@@ -6673,7 +6877,7 @@
             <a:endParaRPr sz="2020" dirty="0"/>
           </a:p>
           <a:p>
-            <a:pPr marL="0" lvl="0" indent="0" algn="l" rtl="0">
+            <a:pPr lvl="0" algn="l" rtl="0">
               <a:lnSpc>
                 <a:spcPct val="100000"/>
               </a:lnSpc>
@@ -6684,24 +6888,26 @@
                 <a:spcPts val="0"/>
               </a:spcAft>
               <a:buSzPct val="49009"/>
-              <a:buNone/>
             </a:pPr>
-            <a:endParaRPr sz="2020" dirty="0"/>
-          </a:p>
-          <a:p>
-            <a:pPr marL="457200" lvl="0" indent="-344043" algn="l" rtl="0">
-              <a:lnSpc>
-                <a:spcPct val="100000"/>
-              </a:lnSpc>
-              <a:spcBef>
-                <a:spcPts val="0"/>
-              </a:spcBef>
-              <a:spcAft>
-                <a:spcPts val="0"/>
-              </a:spcAft>
-              <a:buSzPct val="100000"/>
-              <a:buChar char="-"/>
-            </a:pPr>
+            <a:r>
+              <a:rPr lang="en-US" sz="2020" b="1" dirty="0"/>
+              <a:t>  - Quality Control Checks: </a:t>
+            </a:r>
+            <a:r>
+              <a:rPr lang="en-US" sz="2020" dirty="0"/>
+              <a:t>FASTQC</a:t>
+            </a:r>
+            <a:br>
+              <a:rPr lang="en-US" sz="2020" dirty="0"/>
+            </a:br>
+            <a:r>
+              <a:rPr lang="en-US" sz="2020" dirty="0"/>
+              <a:t>  - </a:t>
+            </a:r>
+            <a:r>
+              <a:rPr lang="en" sz="2020" b="1" dirty="0"/>
+              <a:t>Running scripts: </a:t>
+            </a:r>
             <a:r>
               <a:rPr lang="en" sz="2020" dirty="0"/>
               <a:t>Processing high throughput sequencing files (FASTQ) to obtain a reference genome aligned/mapped SAM/BAM files</a:t>
@@ -6747,11 +6953,11 @@
             </a:pPr>
             <a:r>
               <a:rPr lang="en" sz="2242" b="1" dirty="0"/>
-              <a:t>Part 1 (1 hour): </a:t>
+              <a:t>Part 1 (1 hour): Transforming intermediate files to ones you check </a:t>
             </a:r>
             <a:r>
               <a:rPr lang="en" sz="2242" dirty="0"/>
-              <a:t>Create </a:t>
+              <a:t>(Create </a:t>
             </a:r>
             <a:r>
               <a:rPr lang="en" sz="2242" dirty="0" err="1"/>
@@ -6759,7 +6965,7 @@
             </a:r>
             <a:r>
               <a:rPr lang="en" sz="2242" dirty="0"/>
-              <a:t> and TDFs for visualization (For loops if we have time)</a:t>
+              <a:t> and TDFs for visualization + For loops if we have time)</a:t>
             </a:r>
             <a:br>
               <a:rPr lang="en" sz="2242" dirty="0"/>
@@ -8770,6 +8976,919 @@
   <p:cSld>
     <p:spTree>
       <p:nvGrpSpPr>
+        <p:cNvPr id="1" name=""/>
+        <p:cNvGrpSpPr/>
+        <p:nvPr/>
+      </p:nvGrpSpPr>
+      <p:grpSpPr>
+        <a:xfrm>
+          <a:off x="0" y="0"/>
+          <a:ext cx="0" cy="0"/>
+          <a:chOff x="0" y="0"/>
+          <a:chExt cx="0" cy="0"/>
+        </a:xfrm>
+      </p:grpSpPr>
+      <p:pic>
+        <p:nvPicPr>
+          <p:cNvPr id="3" name="Graphic 2" descr="Walk with solid fill">
+            <a:extLst>
+              <a:ext uri="{FF2B5EF4-FFF2-40B4-BE49-F238E27FC236}">
+                <a16:creationId xmlns:a16="http://schemas.microsoft.com/office/drawing/2014/main" id="{E697DC93-8528-0056-55A9-855594FE3CF6}"/>
+              </a:ext>
+            </a:extLst>
+          </p:cNvPr>
+          <p:cNvPicPr>
+            <a:picLocks noChangeAspect="1"/>
+          </p:cNvPicPr>
+          <p:nvPr/>
+        </p:nvPicPr>
+        <p:blipFill>
+          <a:blip r:embed="rId2">
+            <a:extLst>
+              <a:ext uri="{96DAC541-7B7A-43D3-8B79-37D633B846F1}">
+                <asvg:svgBlip xmlns:asvg="http://schemas.microsoft.com/office/drawing/2016/SVG/main" r:embed="rId3"/>
+              </a:ext>
+            </a:extLst>
+          </a:blip>
+          <a:stretch>
+            <a:fillRect/>
+          </a:stretch>
+        </p:blipFill>
+        <p:spPr>
+          <a:xfrm>
+            <a:off x="1369423" y="1330423"/>
+            <a:ext cx="853440" cy="853440"/>
+          </a:xfrm>
+          <a:prstGeom prst="rect">
+            <a:avLst/>
+          </a:prstGeom>
+        </p:spPr>
+      </p:pic>
+      <p:pic>
+        <p:nvPicPr>
+          <p:cNvPr id="4" name="Graphic 3" descr="Walk with solid fill">
+            <a:extLst>
+              <a:ext uri="{FF2B5EF4-FFF2-40B4-BE49-F238E27FC236}">
+                <a16:creationId xmlns:a16="http://schemas.microsoft.com/office/drawing/2014/main" id="{A035AFF6-7F36-6A81-0684-AC020BF7A59E}"/>
+              </a:ext>
+            </a:extLst>
+          </p:cNvPr>
+          <p:cNvPicPr>
+            <a:picLocks noChangeAspect="1"/>
+          </p:cNvPicPr>
+          <p:nvPr/>
+        </p:nvPicPr>
+        <p:blipFill>
+          <a:blip r:embed="rId2">
+            <a:extLst>
+              <a:ext uri="{96DAC541-7B7A-43D3-8B79-37D633B846F1}">
+                <asvg:svgBlip xmlns:asvg="http://schemas.microsoft.com/office/drawing/2016/SVG/main" r:embed="rId3"/>
+              </a:ext>
+            </a:extLst>
+          </a:blip>
+          <a:stretch>
+            <a:fillRect/>
+          </a:stretch>
+        </p:blipFill>
+        <p:spPr>
+          <a:xfrm>
+            <a:off x="960120" y="1909504"/>
+            <a:ext cx="853440" cy="853440"/>
+          </a:xfrm>
+          <a:prstGeom prst="rect">
+            <a:avLst/>
+          </a:prstGeom>
+        </p:spPr>
+      </p:pic>
+      <p:pic>
+        <p:nvPicPr>
+          <p:cNvPr id="5" name="Graphic 4" descr="Walk with solid fill">
+            <a:extLst>
+              <a:ext uri="{FF2B5EF4-FFF2-40B4-BE49-F238E27FC236}">
+                <a16:creationId xmlns:a16="http://schemas.microsoft.com/office/drawing/2014/main" id="{7C0EEC95-8892-1DD3-4372-0E42734A8635}"/>
+              </a:ext>
+            </a:extLst>
+          </p:cNvPr>
+          <p:cNvPicPr>
+            <a:picLocks noChangeAspect="1"/>
+          </p:cNvPicPr>
+          <p:nvPr/>
+        </p:nvPicPr>
+        <p:blipFill>
+          <a:blip r:embed="rId2">
+            <a:extLst>
+              <a:ext uri="{96DAC541-7B7A-43D3-8B79-37D633B846F1}">
+                <asvg:svgBlip xmlns:asvg="http://schemas.microsoft.com/office/drawing/2016/SVG/main" r:embed="rId3"/>
+              </a:ext>
+            </a:extLst>
+          </a:blip>
+          <a:stretch>
+            <a:fillRect/>
+          </a:stretch>
+        </p:blipFill>
+        <p:spPr>
+          <a:xfrm>
+            <a:off x="1746068" y="1820571"/>
+            <a:ext cx="853440" cy="853440"/>
+          </a:xfrm>
+          <a:prstGeom prst="rect">
+            <a:avLst/>
+          </a:prstGeom>
+        </p:spPr>
+      </p:pic>
+      <p:pic>
+        <p:nvPicPr>
+          <p:cNvPr id="6" name="Graphic 5" descr="Walk with solid fill">
+            <a:extLst>
+              <a:ext uri="{FF2B5EF4-FFF2-40B4-BE49-F238E27FC236}">
+                <a16:creationId xmlns:a16="http://schemas.microsoft.com/office/drawing/2014/main" id="{36BC84E7-78A9-ED91-F6F8-B1AA422579AF}"/>
+              </a:ext>
+            </a:extLst>
+          </p:cNvPr>
+          <p:cNvPicPr>
+            <a:picLocks noChangeAspect="1"/>
+          </p:cNvPicPr>
+          <p:nvPr/>
+        </p:nvPicPr>
+        <p:blipFill>
+          <a:blip r:embed="rId2">
+            <a:extLst>
+              <a:ext uri="{96DAC541-7B7A-43D3-8B79-37D633B846F1}">
+                <asvg:svgBlip xmlns:asvg="http://schemas.microsoft.com/office/drawing/2016/SVG/main" r:embed="rId3"/>
+              </a:ext>
+            </a:extLst>
+          </a:blip>
+          <a:stretch>
+            <a:fillRect/>
+          </a:stretch>
+        </p:blipFill>
+        <p:spPr>
+          <a:xfrm>
+            <a:off x="515982" y="1589358"/>
+            <a:ext cx="853440" cy="853440"/>
+          </a:xfrm>
+          <a:prstGeom prst="rect">
+            <a:avLst/>
+          </a:prstGeom>
+        </p:spPr>
+      </p:pic>
+      <p:sp>
+        <p:nvSpPr>
+          <p:cNvPr id="7" name="Rectangle 6">
+            <a:extLst>
+              <a:ext uri="{FF2B5EF4-FFF2-40B4-BE49-F238E27FC236}">
+                <a16:creationId xmlns:a16="http://schemas.microsoft.com/office/drawing/2014/main" id="{112C4722-98A4-5758-F950-356E032DE27D}"/>
+              </a:ext>
+            </a:extLst>
+          </p:cNvPr>
+          <p:cNvSpPr/>
+          <p:nvPr/>
+        </p:nvSpPr>
+        <p:spPr>
+          <a:xfrm>
+            <a:off x="862147" y="3055334"/>
+            <a:ext cx="696686" cy="750570"/>
+          </a:xfrm>
+          <a:prstGeom prst="rect">
+            <a:avLst/>
+          </a:prstGeom>
+        </p:spPr>
+        <p:style>
+          <a:lnRef idx="2">
+            <a:schemeClr val="accent1">
+              <a:shade val="50000"/>
+            </a:schemeClr>
+          </a:lnRef>
+          <a:fillRef idx="1">
+            <a:schemeClr val="accent1"/>
+          </a:fillRef>
+          <a:effectRef idx="0">
+            <a:schemeClr val="accent1"/>
+          </a:effectRef>
+          <a:fontRef idx="minor">
+            <a:schemeClr val="lt1"/>
+          </a:fontRef>
+        </p:style>
+        <p:txBody>
+          <a:bodyPr rtlCol="0" anchor="ctr"/>
+          <a:lstStyle/>
+          <a:p>
+            <a:pPr algn="ctr"/>
+            <a:r>
+              <a:rPr lang="en-US" dirty="0" err="1"/>
+              <a:t>Fastq</a:t>
+            </a:r>
+            <a:endParaRPr lang="en-US" dirty="0"/>
+          </a:p>
+        </p:txBody>
+      </p:sp>
+      <p:sp>
+        <p:nvSpPr>
+          <p:cNvPr id="8" name="Rectangle 7">
+            <a:extLst>
+              <a:ext uri="{FF2B5EF4-FFF2-40B4-BE49-F238E27FC236}">
+                <a16:creationId xmlns:a16="http://schemas.microsoft.com/office/drawing/2014/main" id="{4236955A-EE32-2F4E-B190-0BE98B1C76E8}"/>
+              </a:ext>
+            </a:extLst>
+          </p:cNvPr>
+          <p:cNvSpPr/>
+          <p:nvPr/>
+        </p:nvSpPr>
+        <p:spPr>
+          <a:xfrm>
+            <a:off x="1715587" y="3055334"/>
+            <a:ext cx="696686" cy="750570"/>
+          </a:xfrm>
+          <a:prstGeom prst="rect">
+            <a:avLst/>
+          </a:prstGeom>
+        </p:spPr>
+        <p:style>
+          <a:lnRef idx="2">
+            <a:schemeClr val="accent1">
+              <a:shade val="50000"/>
+            </a:schemeClr>
+          </a:lnRef>
+          <a:fillRef idx="1">
+            <a:schemeClr val="accent1"/>
+          </a:fillRef>
+          <a:effectRef idx="0">
+            <a:schemeClr val="accent1"/>
+          </a:effectRef>
+          <a:fontRef idx="minor">
+            <a:schemeClr val="lt1"/>
+          </a:fontRef>
+        </p:style>
+        <p:txBody>
+          <a:bodyPr rtlCol="0" anchor="ctr"/>
+          <a:lstStyle/>
+          <a:p>
+            <a:pPr algn="ctr"/>
+            <a:r>
+              <a:rPr lang="en-US" dirty="0" err="1"/>
+              <a:t>Fastq</a:t>
+            </a:r>
+            <a:endParaRPr lang="en-US" dirty="0"/>
+          </a:p>
+        </p:txBody>
+      </p:sp>
+      <p:sp>
+        <p:nvSpPr>
+          <p:cNvPr id="9" name="Rectangle 8">
+            <a:extLst>
+              <a:ext uri="{FF2B5EF4-FFF2-40B4-BE49-F238E27FC236}">
+                <a16:creationId xmlns:a16="http://schemas.microsoft.com/office/drawing/2014/main" id="{C6330C78-56C6-AF07-611C-8CA7A93F5183}"/>
+              </a:ext>
+            </a:extLst>
+          </p:cNvPr>
+          <p:cNvSpPr/>
+          <p:nvPr/>
+        </p:nvSpPr>
+        <p:spPr>
+          <a:xfrm>
+            <a:off x="862147" y="3936531"/>
+            <a:ext cx="696686" cy="750570"/>
+          </a:xfrm>
+          <a:prstGeom prst="rect">
+            <a:avLst/>
+          </a:prstGeom>
+        </p:spPr>
+        <p:style>
+          <a:lnRef idx="2">
+            <a:schemeClr val="accent1">
+              <a:shade val="50000"/>
+            </a:schemeClr>
+          </a:lnRef>
+          <a:fillRef idx="1">
+            <a:schemeClr val="accent1"/>
+          </a:fillRef>
+          <a:effectRef idx="0">
+            <a:schemeClr val="accent1"/>
+          </a:effectRef>
+          <a:fontRef idx="minor">
+            <a:schemeClr val="lt1"/>
+          </a:fontRef>
+        </p:style>
+        <p:txBody>
+          <a:bodyPr rtlCol="0" anchor="ctr"/>
+          <a:lstStyle/>
+          <a:p>
+            <a:pPr algn="ctr"/>
+            <a:r>
+              <a:rPr lang="en-US" dirty="0" err="1"/>
+              <a:t>Fastq</a:t>
+            </a:r>
+            <a:endParaRPr lang="en-US" dirty="0"/>
+          </a:p>
+        </p:txBody>
+      </p:sp>
+      <p:sp>
+        <p:nvSpPr>
+          <p:cNvPr id="10" name="Rectangle 9">
+            <a:extLst>
+              <a:ext uri="{FF2B5EF4-FFF2-40B4-BE49-F238E27FC236}">
+                <a16:creationId xmlns:a16="http://schemas.microsoft.com/office/drawing/2014/main" id="{A5CF93F7-0899-DDB7-0DE0-CAFB795B25AA}"/>
+              </a:ext>
+            </a:extLst>
+          </p:cNvPr>
+          <p:cNvSpPr/>
+          <p:nvPr/>
+        </p:nvSpPr>
+        <p:spPr>
+          <a:xfrm>
+            <a:off x="1715587" y="3936531"/>
+            <a:ext cx="696686" cy="750570"/>
+          </a:xfrm>
+          <a:prstGeom prst="rect">
+            <a:avLst/>
+          </a:prstGeom>
+        </p:spPr>
+        <p:style>
+          <a:lnRef idx="2">
+            <a:schemeClr val="accent1">
+              <a:shade val="50000"/>
+            </a:schemeClr>
+          </a:lnRef>
+          <a:fillRef idx="1">
+            <a:schemeClr val="accent1"/>
+          </a:fillRef>
+          <a:effectRef idx="0">
+            <a:schemeClr val="accent1"/>
+          </a:effectRef>
+          <a:fontRef idx="minor">
+            <a:schemeClr val="lt1"/>
+          </a:fontRef>
+        </p:style>
+        <p:txBody>
+          <a:bodyPr rtlCol="0" anchor="ctr"/>
+          <a:lstStyle/>
+          <a:p>
+            <a:pPr algn="ctr"/>
+            <a:r>
+              <a:rPr lang="en-US" dirty="0" err="1"/>
+              <a:t>Fastq</a:t>
+            </a:r>
+            <a:endParaRPr lang="en-US" dirty="0"/>
+          </a:p>
+        </p:txBody>
+      </p:sp>
+      <p:sp>
+        <p:nvSpPr>
+          <p:cNvPr id="12" name="TextBox 11">
+            <a:extLst>
+              <a:ext uri="{FF2B5EF4-FFF2-40B4-BE49-F238E27FC236}">
+                <a16:creationId xmlns:a16="http://schemas.microsoft.com/office/drawing/2014/main" id="{FEBA1C8C-6D19-EF53-C556-696F56F8DDCB}"/>
+              </a:ext>
+            </a:extLst>
+          </p:cNvPr>
+          <p:cNvSpPr txBox="1"/>
+          <p:nvPr/>
+        </p:nvSpPr>
+        <p:spPr>
+          <a:xfrm>
+            <a:off x="679267" y="188803"/>
+            <a:ext cx="2072640" cy="954107"/>
+          </a:xfrm>
+          <a:prstGeom prst="rect">
+            <a:avLst/>
+          </a:prstGeom>
+          <a:noFill/>
+        </p:spPr>
+        <p:txBody>
+          <a:bodyPr wrap="square" rtlCol="0">
+            <a:spAutoFit/>
+          </a:bodyPr>
+          <a:lstStyle/>
+          <a:p>
+            <a:pPr algn="ctr"/>
+            <a:r>
+              <a:rPr lang="en-US" dirty="0"/>
+              <a:t>Contestants to go through code (obstacle course). There are multiple.</a:t>
+            </a:r>
+          </a:p>
+        </p:txBody>
+      </p:sp>
+      <p:sp>
+        <p:nvSpPr>
+          <p:cNvPr id="13" name="TextBox 12">
+            <a:extLst>
+              <a:ext uri="{FF2B5EF4-FFF2-40B4-BE49-F238E27FC236}">
+                <a16:creationId xmlns:a16="http://schemas.microsoft.com/office/drawing/2014/main" id="{EB4F9051-09BF-9834-F002-0BFD3B38C0AC}"/>
+              </a:ext>
+            </a:extLst>
+          </p:cNvPr>
+          <p:cNvSpPr txBox="1"/>
+          <p:nvPr/>
+        </p:nvSpPr>
+        <p:spPr>
+          <a:xfrm>
+            <a:off x="3535680" y="287383"/>
+            <a:ext cx="2072640" cy="954107"/>
+          </a:xfrm>
+          <a:prstGeom prst="rect">
+            <a:avLst/>
+          </a:prstGeom>
+          <a:noFill/>
+        </p:spPr>
+        <p:txBody>
+          <a:bodyPr wrap="square" rtlCol="0">
+            <a:spAutoFit/>
+          </a:bodyPr>
+          <a:lstStyle/>
+          <a:p>
+            <a:pPr algn="ctr"/>
+            <a:r>
+              <a:rPr lang="en-US" dirty="0"/>
+              <a:t>The code (obstacle course) that stays the same and we want to reuse.</a:t>
+            </a:r>
+          </a:p>
+        </p:txBody>
+      </p:sp>
+      <p:pic>
+        <p:nvPicPr>
+          <p:cNvPr id="1026" name="Picture 2">
+            <a:extLst>
+              <a:ext uri="{FF2B5EF4-FFF2-40B4-BE49-F238E27FC236}">
+                <a16:creationId xmlns:a16="http://schemas.microsoft.com/office/drawing/2014/main" id="{FD3581C7-C2D2-61AD-C743-452E89713D97}"/>
+              </a:ext>
+            </a:extLst>
+          </p:cNvPr>
+          <p:cNvPicPr>
+            <a:picLocks noChangeAspect="1" noChangeArrowheads="1"/>
+          </p:cNvPicPr>
+          <p:nvPr/>
+        </p:nvPicPr>
+        <p:blipFill rotWithShape="1">
+          <a:blip r:embed="rId4">
+            <a:extLst>
+              <a:ext uri="{28A0092B-C50C-407E-A947-70E740481C1C}">
+                <a14:useLocalDpi xmlns:a14="http://schemas.microsoft.com/office/drawing/2010/main" val="0"/>
+              </a:ext>
+            </a:extLst>
+          </a:blip>
+          <a:srcRect l="8351" t="34032" r="47603" b="38540"/>
+          <a:stretch/>
+        </p:blipFill>
+        <p:spPr bwMode="auto">
+          <a:xfrm>
+            <a:off x="3184101" y="1481592"/>
+            <a:ext cx="1769682" cy="855824"/>
+          </a:xfrm>
+          <a:prstGeom prst="rect">
+            <a:avLst/>
+          </a:prstGeom>
+          <a:noFill/>
+          <a:extLst>
+            <a:ext uri="{909E8E84-426E-40DD-AFC4-6F175D3DCCD1}">
+              <a14:hiddenFill xmlns:a14="http://schemas.microsoft.com/office/drawing/2010/main">
+                <a:solidFill>
+                  <a:srgbClr val="FFFFFF"/>
+                </a:solidFill>
+              </a14:hiddenFill>
+            </a:ext>
+          </a:extLst>
+        </p:spPr>
+      </p:pic>
+      <p:sp>
+        <p:nvSpPr>
+          <p:cNvPr id="14" name="Rectangle 13">
+            <a:extLst>
+              <a:ext uri="{FF2B5EF4-FFF2-40B4-BE49-F238E27FC236}">
+                <a16:creationId xmlns:a16="http://schemas.microsoft.com/office/drawing/2014/main" id="{7CADAED6-359A-6D48-1655-C495BCF3E55A}"/>
+              </a:ext>
+            </a:extLst>
+          </p:cNvPr>
+          <p:cNvSpPr/>
+          <p:nvPr/>
+        </p:nvSpPr>
+        <p:spPr>
+          <a:xfrm>
+            <a:off x="3351226" y="1640264"/>
+            <a:ext cx="542042" cy="375814"/>
+          </a:xfrm>
+          <a:prstGeom prst="rect">
+            <a:avLst/>
+          </a:prstGeom>
+          <a:ln>
+            <a:solidFill>
+              <a:schemeClr val="bg1"/>
+            </a:solidFill>
+          </a:ln>
+        </p:spPr>
+        <p:style>
+          <a:lnRef idx="2">
+            <a:schemeClr val="accent2"/>
+          </a:lnRef>
+          <a:fillRef idx="1">
+            <a:schemeClr val="lt1"/>
+          </a:fillRef>
+          <a:effectRef idx="0">
+            <a:schemeClr val="accent2"/>
+          </a:effectRef>
+          <a:fontRef idx="minor">
+            <a:schemeClr val="dk1"/>
+          </a:fontRef>
+        </p:style>
+        <p:txBody>
+          <a:bodyPr rtlCol="0" anchor="ctr"/>
+          <a:lstStyle/>
+          <a:p>
+            <a:pPr algn="ctr"/>
+            <a:endParaRPr lang="en-US"/>
+          </a:p>
+        </p:txBody>
+      </p:sp>
+      <p:sp>
+        <p:nvSpPr>
+          <p:cNvPr id="15" name="Rectangle 14">
+            <a:extLst>
+              <a:ext uri="{FF2B5EF4-FFF2-40B4-BE49-F238E27FC236}">
+                <a16:creationId xmlns:a16="http://schemas.microsoft.com/office/drawing/2014/main" id="{872A327D-E4E7-1EDE-06C2-19325C7578FA}"/>
+              </a:ext>
+            </a:extLst>
+          </p:cNvPr>
+          <p:cNvSpPr/>
+          <p:nvPr/>
+        </p:nvSpPr>
+        <p:spPr>
+          <a:xfrm>
+            <a:off x="4419439" y="1640264"/>
+            <a:ext cx="326954" cy="375814"/>
+          </a:xfrm>
+          <a:prstGeom prst="rect">
+            <a:avLst/>
+          </a:prstGeom>
+          <a:ln>
+            <a:solidFill>
+              <a:schemeClr val="bg1"/>
+            </a:solidFill>
+          </a:ln>
+        </p:spPr>
+        <p:style>
+          <a:lnRef idx="2">
+            <a:schemeClr val="accent2"/>
+          </a:lnRef>
+          <a:fillRef idx="1">
+            <a:schemeClr val="lt1"/>
+          </a:fillRef>
+          <a:effectRef idx="0">
+            <a:schemeClr val="accent2"/>
+          </a:effectRef>
+          <a:fontRef idx="minor">
+            <a:schemeClr val="dk1"/>
+          </a:fontRef>
+        </p:style>
+        <p:txBody>
+          <a:bodyPr rtlCol="0" anchor="ctr"/>
+          <a:lstStyle/>
+          <a:p>
+            <a:pPr algn="ctr"/>
+            <a:endParaRPr lang="en-US"/>
+          </a:p>
+        </p:txBody>
+      </p:sp>
+      <p:sp>
+        <p:nvSpPr>
+          <p:cNvPr id="16" name="Rectangle 15">
+            <a:extLst>
+              <a:ext uri="{FF2B5EF4-FFF2-40B4-BE49-F238E27FC236}">
+                <a16:creationId xmlns:a16="http://schemas.microsoft.com/office/drawing/2014/main" id="{3C29D1A0-D86A-84F4-8325-2666DE101527}"/>
+              </a:ext>
+            </a:extLst>
+          </p:cNvPr>
+          <p:cNvSpPr/>
+          <p:nvPr/>
+        </p:nvSpPr>
+        <p:spPr>
+          <a:xfrm>
+            <a:off x="5618373" y="1970201"/>
+            <a:ext cx="326954" cy="127209"/>
+          </a:xfrm>
+          <a:prstGeom prst="rect">
+            <a:avLst/>
+          </a:prstGeom>
+          <a:ln>
+            <a:solidFill>
+              <a:schemeClr val="bg1"/>
+            </a:solidFill>
+          </a:ln>
+        </p:spPr>
+        <p:style>
+          <a:lnRef idx="2">
+            <a:schemeClr val="accent2"/>
+          </a:lnRef>
+          <a:fillRef idx="1">
+            <a:schemeClr val="lt1"/>
+          </a:fillRef>
+          <a:effectRef idx="0">
+            <a:schemeClr val="accent2"/>
+          </a:effectRef>
+          <a:fontRef idx="minor">
+            <a:schemeClr val="dk1"/>
+          </a:fontRef>
+        </p:style>
+        <p:txBody>
+          <a:bodyPr rtlCol="0" anchor="ctr"/>
+          <a:lstStyle/>
+          <a:p>
+            <a:pPr algn="ctr"/>
+            <a:endParaRPr lang="en-US"/>
+          </a:p>
+        </p:txBody>
+      </p:sp>
+      <p:pic>
+        <p:nvPicPr>
+          <p:cNvPr id="17" name="Picture 2">
+            <a:extLst>
+              <a:ext uri="{FF2B5EF4-FFF2-40B4-BE49-F238E27FC236}">
+                <a16:creationId xmlns:a16="http://schemas.microsoft.com/office/drawing/2014/main" id="{3676AD6E-91DE-B8B6-62F8-84296D67455B}"/>
+              </a:ext>
+            </a:extLst>
+          </p:cNvPr>
+          <p:cNvPicPr>
+            <a:picLocks noChangeAspect="1" noChangeArrowheads="1"/>
+          </p:cNvPicPr>
+          <p:nvPr/>
+        </p:nvPicPr>
+        <p:blipFill rotWithShape="1">
+          <a:blip r:embed="rId4">
+            <a:extLst>
+              <a:ext uri="{28A0092B-C50C-407E-A947-70E740481C1C}">
+                <a14:useLocalDpi xmlns:a14="http://schemas.microsoft.com/office/drawing/2010/main" val="0"/>
+              </a:ext>
+            </a:extLst>
+          </a:blip>
+          <a:srcRect l="65286" t="35148" r="6801" b="37424"/>
+          <a:stretch/>
+        </p:blipFill>
+        <p:spPr bwMode="auto">
+          <a:xfrm>
+            <a:off x="4823872" y="1486251"/>
+            <a:ext cx="1121455" cy="855824"/>
+          </a:xfrm>
+          <a:prstGeom prst="rect">
+            <a:avLst/>
+          </a:prstGeom>
+          <a:noFill/>
+          <a:extLst>
+            <a:ext uri="{909E8E84-426E-40DD-AFC4-6F175D3DCCD1}">
+              <a14:hiddenFill xmlns:a14="http://schemas.microsoft.com/office/drawing/2010/main">
+                <a:solidFill>
+                  <a:srgbClr val="FFFFFF"/>
+                </a:solidFill>
+              </a14:hiddenFill>
+            </a:ext>
+          </a:extLst>
+        </p:spPr>
+      </p:pic>
+      <p:sp>
+        <p:nvSpPr>
+          <p:cNvPr id="18" name="Rectangle 17">
+            <a:extLst>
+              <a:ext uri="{FF2B5EF4-FFF2-40B4-BE49-F238E27FC236}">
+                <a16:creationId xmlns:a16="http://schemas.microsoft.com/office/drawing/2014/main" id="{46B4ECC7-078E-41C9-3FFD-8D4151039D37}"/>
+              </a:ext>
+            </a:extLst>
+          </p:cNvPr>
+          <p:cNvSpPr/>
+          <p:nvPr/>
+        </p:nvSpPr>
+        <p:spPr>
+          <a:xfrm>
+            <a:off x="4959124" y="1721597"/>
+            <a:ext cx="326954" cy="375814"/>
+          </a:xfrm>
+          <a:prstGeom prst="rect">
+            <a:avLst/>
+          </a:prstGeom>
+          <a:ln>
+            <a:solidFill>
+              <a:schemeClr val="bg1"/>
+            </a:solidFill>
+          </a:ln>
+        </p:spPr>
+        <p:style>
+          <a:lnRef idx="2">
+            <a:schemeClr val="accent2"/>
+          </a:lnRef>
+          <a:fillRef idx="1">
+            <a:schemeClr val="lt1"/>
+          </a:fillRef>
+          <a:effectRef idx="0">
+            <a:schemeClr val="accent2"/>
+          </a:effectRef>
+          <a:fontRef idx="minor">
+            <a:schemeClr val="dk1"/>
+          </a:fontRef>
+        </p:style>
+        <p:txBody>
+          <a:bodyPr rtlCol="0" anchor="ctr"/>
+          <a:lstStyle/>
+          <a:p>
+            <a:pPr algn="ctr"/>
+            <a:endParaRPr lang="en-US"/>
+          </a:p>
+        </p:txBody>
+      </p:sp>
+      <p:sp>
+        <p:nvSpPr>
+          <p:cNvPr id="19" name="Rectangle 18">
+            <a:extLst>
+              <a:ext uri="{FF2B5EF4-FFF2-40B4-BE49-F238E27FC236}">
+                <a16:creationId xmlns:a16="http://schemas.microsoft.com/office/drawing/2014/main" id="{C5A3C2EB-10CA-B143-180B-23492BF3253A}"/>
+              </a:ext>
+            </a:extLst>
+          </p:cNvPr>
+          <p:cNvSpPr/>
+          <p:nvPr/>
+        </p:nvSpPr>
+        <p:spPr>
+          <a:xfrm>
+            <a:off x="3862976" y="3055333"/>
+            <a:ext cx="1485537" cy="1132037"/>
+          </a:xfrm>
+          <a:prstGeom prst="rect">
+            <a:avLst/>
+          </a:prstGeom>
+        </p:spPr>
+        <p:style>
+          <a:lnRef idx="2">
+            <a:schemeClr val="accent1">
+              <a:shade val="50000"/>
+            </a:schemeClr>
+          </a:lnRef>
+          <a:fillRef idx="1">
+            <a:schemeClr val="accent1"/>
+          </a:fillRef>
+          <a:effectRef idx="0">
+            <a:schemeClr val="accent1"/>
+          </a:effectRef>
+          <a:fontRef idx="minor">
+            <a:schemeClr val="lt1"/>
+          </a:fontRef>
+        </p:style>
+        <p:txBody>
+          <a:bodyPr rtlCol="0" anchor="ctr"/>
+          <a:lstStyle/>
+          <a:p>
+            <a:pPr algn="ctr"/>
+            <a:r>
+              <a:rPr lang="en-US" dirty="0"/>
+              <a:t>Script: d5-fastq-to-tdf.sbatch</a:t>
+            </a:r>
+          </a:p>
+        </p:txBody>
+      </p:sp>
+      <p:sp>
+        <p:nvSpPr>
+          <p:cNvPr id="20" name="TextBox 19">
+            <a:extLst>
+              <a:ext uri="{FF2B5EF4-FFF2-40B4-BE49-F238E27FC236}">
+                <a16:creationId xmlns:a16="http://schemas.microsoft.com/office/drawing/2014/main" id="{7A28DFB9-57B7-13EC-84DA-0A066060F499}"/>
+              </a:ext>
+            </a:extLst>
+          </p:cNvPr>
+          <p:cNvSpPr txBox="1"/>
+          <p:nvPr/>
+        </p:nvSpPr>
+        <p:spPr>
+          <a:xfrm>
+            <a:off x="5781849" y="67686"/>
+            <a:ext cx="2251807" cy="1169551"/>
+          </a:xfrm>
+          <a:prstGeom prst="rect">
+            <a:avLst/>
+          </a:prstGeom>
+          <a:noFill/>
+        </p:spPr>
+        <p:txBody>
+          <a:bodyPr wrap="square" rtlCol="0">
+            <a:spAutoFit/>
+          </a:bodyPr>
+          <a:lstStyle/>
+          <a:p>
+            <a:pPr algn="ctr"/>
+            <a:r>
+              <a:rPr lang="en-US" dirty="0"/>
+              <a:t>The coordinator that tells the contestants to go on the obstacle course. This is what actually gets everything going.</a:t>
+            </a:r>
+          </a:p>
+        </p:txBody>
+      </p:sp>
+      <p:pic>
+        <p:nvPicPr>
+          <p:cNvPr id="1028" name="Picture 4">
+            <a:extLst>
+              <a:ext uri="{FF2B5EF4-FFF2-40B4-BE49-F238E27FC236}">
+                <a16:creationId xmlns:a16="http://schemas.microsoft.com/office/drawing/2014/main" id="{9F3BBF33-982C-F2EC-F760-18FE9C565B79}"/>
+              </a:ext>
+            </a:extLst>
+          </p:cNvPr>
+          <p:cNvPicPr>
+            <a:picLocks noChangeAspect="1" noChangeArrowheads="1"/>
+          </p:cNvPicPr>
+          <p:nvPr/>
+        </p:nvPicPr>
+        <p:blipFill>
+          <a:blip r:embed="rId5">
+            <a:extLst>
+              <a:ext uri="{28A0092B-C50C-407E-A947-70E740481C1C}">
+                <a14:useLocalDpi xmlns:a14="http://schemas.microsoft.com/office/drawing/2010/main" val="0"/>
+              </a:ext>
+            </a:extLst>
+          </a:blip>
+          <a:srcRect/>
+          <a:stretch>
+            <a:fillRect/>
+          </a:stretch>
+        </p:blipFill>
+        <p:spPr bwMode="auto">
+          <a:xfrm>
+            <a:off x="6338452" y="1258284"/>
+            <a:ext cx="959436" cy="1337596"/>
+          </a:xfrm>
+          <a:prstGeom prst="rect">
+            <a:avLst/>
+          </a:prstGeom>
+          <a:noFill/>
+          <a:extLst>
+            <a:ext uri="{909E8E84-426E-40DD-AFC4-6F175D3DCCD1}">
+              <a14:hiddenFill xmlns:a14="http://schemas.microsoft.com/office/drawing/2010/main">
+                <a:solidFill>
+                  <a:srgbClr val="FFFFFF"/>
+                </a:solidFill>
+              </a14:hiddenFill>
+            </a:ext>
+          </a:extLst>
+        </p:spPr>
+      </p:pic>
+      <p:sp>
+        <p:nvSpPr>
+          <p:cNvPr id="23" name="Rectangle 22">
+            <a:extLst>
+              <a:ext uri="{FF2B5EF4-FFF2-40B4-BE49-F238E27FC236}">
+                <a16:creationId xmlns:a16="http://schemas.microsoft.com/office/drawing/2014/main" id="{C48EF1E8-4D9F-A88A-CCCC-0687D840CECE}"/>
+              </a:ext>
+            </a:extLst>
+          </p:cNvPr>
+          <p:cNvSpPr/>
+          <p:nvPr/>
+        </p:nvSpPr>
+        <p:spPr>
+          <a:xfrm>
+            <a:off x="6202179" y="3055332"/>
+            <a:ext cx="1485537" cy="1132037"/>
+          </a:xfrm>
+          <a:prstGeom prst="rect">
+            <a:avLst/>
+          </a:prstGeom>
+        </p:spPr>
+        <p:style>
+          <a:lnRef idx="2">
+            <a:schemeClr val="accent1">
+              <a:shade val="50000"/>
+            </a:schemeClr>
+          </a:lnRef>
+          <a:fillRef idx="1">
+            <a:schemeClr val="accent1"/>
+          </a:fillRef>
+          <a:effectRef idx="0">
+            <a:schemeClr val="accent1"/>
+          </a:effectRef>
+          <a:fontRef idx="minor">
+            <a:schemeClr val="lt1"/>
+          </a:fontRef>
+        </p:style>
+        <p:txBody>
+          <a:bodyPr rtlCol="0" anchor="ctr"/>
+          <a:lstStyle/>
+          <a:p>
+            <a:pPr algn="ctr"/>
+            <a:r>
+              <a:rPr lang="en-US" dirty="0"/>
+              <a:t>Script: run_d5-fastq-to-tdf.sbatch</a:t>
+            </a:r>
+          </a:p>
+        </p:txBody>
+      </p:sp>
+    </p:spTree>
+    <p:extLst>
+      <p:ext uri="{BB962C8B-B14F-4D97-AF65-F5344CB8AC3E}">
+        <p14:creationId xmlns:p14="http://schemas.microsoft.com/office/powerpoint/2010/main" val="921130233"/>
+      </p:ext>
+    </p:extLst>
+  </p:cSld>
+  <p:clrMapOvr>
+    <a:masterClrMapping/>
+  </p:clrMapOvr>
+</p:sld>
+</file>
+
+<file path=ppt/slides/slide8.xml><?xml version="1.0" encoding="utf-8"?>
+<p:sld xmlns:a="http://schemas.openxmlformats.org/drawingml/2006/main" xmlns:r="http://schemas.openxmlformats.org/officeDocument/2006/relationships" xmlns:p="http://schemas.openxmlformats.org/presentationml/2006/main">
+  <p:cSld>
+    <p:spTree>
+      <p:nvGrpSpPr>
         <p:cNvPr id="1" name="Shape 127"/>
         <p:cNvGrpSpPr/>
         <p:nvPr/>
@@ -9249,7 +10368,7 @@
 </p:sld>
 </file>
 
-<file path=ppt/slides/slide8.xml><?xml version="1.0" encoding="utf-8"?>
+<file path=ppt/slides/slide9.xml><?xml version="1.0" encoding="utf-8"?>
 <p:sld xmlns:a="http://schemas.openxmlformats.org/drawingml/2006/main" xmlns:r="http://schemas.openxmlformats.org/officeDocument/2006/relationships" xmlns:p="http://schemas.openxmlformats.org/presentationml/2006/main">
   <p:cSld>
     <p:spTree>
@@ -9308,231 +10427,6 @@
         <p14:creationId xmlns:p14="http://schemas.microsoft.com/office/powerpoint/2010/main" val="2535294176"/>
       </p:ext>
     </p:extLst>
-  </p:cSld>
-  <p:clrMapOvr>
-    <a:masterClrMapping/>
-  </p:clrMapOvr>
-</p:sld>
-</file>
-
-<file path=ppt/slides/slide9.xml><?xml version="1.0" encoding="utf-8"?>
-<p:sld xmlns:a="http://schemas.openxmlformats.org/drawingml/2006/main" xmlns:r="http://schemas.openxmlformats.org/officeDocument/2006/relationships" xmlns:p="http://schemas.openxmlformats.org/presentationml/2006/main">
-  <p:cSld>
-    <p:spTree>
-      <p:nvGrpSpPr>
-        <p:cNvPr id="1" name="Shape 166"/>
-        <p:cNvGrpSpPr/>
-        <p:nvPr/>
-      </p:nvGrpSpPr>
-      <p:grpSpPr>
-        <a:xfrm>
-          <a:off x="0" y="0"/>
-          <a:ext cx="0" cy="0"/>
-          <a:chOff x="0" y="0"/>
-          <a:chExt cx="0" cy="0"/>
-        </a:xfrm>
-      </p:grpSpPr>
-      <p:sp>
-        <p:nvSpPr>
-          <p:cNvPr id="167" name="Google Shape;167;p23"/>
-          <p:cNvSpPr txBox="1">
-            <a:spLocks noGrp="1"/>
-          </p:cNvSpPr>
-          <p:nvPr>
-            <p:ph type="title"/>
-          </p:nvPr>
-        </p:nvSpPr>
-        <p:spPr>
-          <a:xfrm>
-            <a:off x="212100" y="168750"/>
-            <a:ext cx="8719800" cy="4806000"/>
-          </a:xfrm>
-          <a:prstGeom prst="rect">
-            <a:avLst/>
-          </a:prstGeom>
-        </p:spPr>
-        <p:txBody>
-          <a:bodyPr spcFirstLastPara="1" wrap="square" lIns="91425" tIns="91425" rIns="91425" bIns="91425" anchor="ctr" anchorCtr="0">
-            <a:normAutofit/>
-          </a:bodyPr>
-          <a:lstStyle/>
-          <a:p>
-            <a:pPr marL="0" lvl="0" indent="0" algn="ctr" rtl="0">
-              <a:spcBef>
-                <a:spcPts val="0"/>
-              </a:spcBef>
-              <a:spcAft>
-                <a:spcPts val="0"/>
-              </a:spcAft>
-              <a:buNone/>
-            </a:pPr>
-            <a:r>
-              <a:rPr lang="en" dirty="0"/>
-              <a:t>Check out the other FASTQ datasets in Day5.</a:t>
-            </a:r>
-            <a:br>
-              <a:rPr lang="en" dirty="0"/>
-            </a:br>
-            <a:br>
-              <a:rPr lang="en-US" dirty="0"/>
-            </a:br>
-            <a:r>
-              <a:rPr lang="en-US" dirty="0"/>
-              <a:t>Imagine these files are fresh off the sequencer… can you write your own scripts to turn them from raw FASTQs to TDFs? What QC checks should you perform?</a:t>
-            </a:r>
-            <a:endParaRPr dirty="0"/>
-          </a:p>
-          <a:p>
-            <a:pPr marL="0" lvl="0" indent="0" algn="ctr" rtl="0">
-              <a:spcBef>
-                <a:spcPts val="0"/>
-              </a:spcBef>
-              <a:spcAft>
-                <a:spcPts val="0"/>
-              </a:spcAft>
-              <a:buNone/>
-            </a:pPr>
-            <a:endParaRPr dirty="0"/>
-          </a:p>
-          <a:p>
-            <a:pPr marL="0" lvl="0" indent="0" algn="ctr" rtl="0">
-              <a:spcBef>
-                <a:spcPts val="0"/>
-              </a:spcBef>
-              <a:spcAft>
-                <a:spcPts val="0"/>
-              </a:spcAft>
-              <a:buNone/>
-            </a:pPr>
-            <a:r>
-              <a:rPr lang="en" sz="2244" dirty="0"/>
-              <a:t>(Extra-very-real-points: Do all files with a loop!)</a:t>
-            </a:r>
-            <a:endParaRPr sz="2244" dirty="0"/>
-          </a:p>
-          <a:p>
-            <a:pPr marL="0" lvl="0" indent="0" algn="ctr" rtl="0">
-              <a:spcBef>
-                <a:spcPts val="0"/>
-              </a:spcBef>
-              <a:spcAft>
-                <a:spcPts val="0"/>
-              </a:spcAft>
-              <a:buNone/>
-            </a:pPr>
-            <a:endParaRPr dirty="0"/>
-          </a:p>
-          <a:p>
-            <a:pPr marL="0" lvl="0" indent="0" algn="ctr" rtl="0">
-              <a:spcBef>
-                <a:spcPts val="0"/>
-              </a:spcBef>
-              <a:spcAft>
-                <a:spcPts val="0"/>
-              </a:spcAft>
-              <a:buNone/>
-            </a:pPr>
-            <a:r>
-              <a:rPr lang="en" dirty="0">
-                <a:solidFill>
-                  <a:srgbClr val="000000"/>
-                </a:solidFill>
-              </a:rPr>
-              <a:t>          FASTQ</a:t>
-            </a:r>
-            <a:r>
-              <a:rPr lang="en" dirty="0"/>
-              <a:t> ➡ SAM ➡ BAM ➡</a:t>
-            </a:r>
-            <a:endParaRPr dirty="0"/>
-          </a:p>
-          <a:p>
-            <a:pPr marL="0" lvl="0" indent="0" algn="ctr" rtl="0">
-              <a:spcBef>
-                <a:spcPts val="0"/>
-              </a:spcBef>
-              <a:spcAft>
-                <a:spcPts val="0"/>
-              </a:spcAft>
-              <a:buNone/>
-            </a:pPr>
-            <a:r>
-              <a:rPr lang="en" dirty="0"/>
-              <a:t> ➡ BEDGRAPH ➡ TDF    </a:t>
-            </a:r>
-            <a:r>
-              <a:rPr lang="en" dirty="0">
-                <a:solidFill>
-                  <a:srgbClr val="FFFFFF"/>
-                </a:solidFill>
-              </a:rPr>
-              <a:t>F</a:t>
-            </a:r>
-            <a:r>
-              <a:rPr lang="en" dirty="0"/>
-              <a:t>   </a:t>
-            </a:r>
-            <a:endParaRPr dirty="0"/>
-          </a:p>
-        </p:txBody>
-      </p:sp>
-      <p:pic>
-        <p:nvPicPr>
-          <p:cNvPr id="168" name="Google Shape;168;p23"/>
-          <p:cNvPicPr preferRelativeResize="0"/>
-          <p:nvPr/>
-        </p:nvPicPr>
-        <p:blipFill>
-          <a:blip r:embed="rId3">
-            <a:alphaModFix/>
-          </a:blip>
-          <a:stretch>
-            <a:fillRect/>
-          </a:stretch>
-        </p:blipFill>
-        <p:spPr>
-          <a:xfrm>
-            <a:off x="2164208" y="3831559"/>
-            <a:ext cx="684650" cy="443625"/>
-          </a:xfrm>
-          <a:prstGeom prst="rect">
-            <a:avLst/>
-          </a:prstGeom>
-          <a:noFill/>
-          <a:ln>
-            <a:noFill/>
-          </a:ln>
-        </p:spPr>
-      </p:pic>
-      <p:pic>
-        <p:nvPicPr>
-          <p:cNvPr id="169" name="Google Shape;169;p23"/>
-          <p:cNvPicPr preferRelativeResize="0"/>
-          <p:nvPr/>
-        </p:nvPicPr>
-        <p:blipFill>
-          <a:blip r:embed="rId4">
-            <a:alphaModFix/>
-          </a:blip>
-          <a:stretch>
-            <a:fillRect/>
-          </a:stretch>
-        </p:blipFill>
-        <p:spPr>
-          <a:xfrm>
-            <a:off x="6287167" y="4454294"/>
-            <a:ext cx="711478" cy="443625"/>
-          </a:xfrm>
-          <a:prstGeom prst="rect">
-            <a:avLst/>
-          </a:prstGeom>
-          <a:noFill/>
-          <a:ln>
-            <a:noFill/>
-          </a:ln>
-        </p:spPr>
-      </p:pic>
-    </p:spTree>
   </p:cSld>
   <p:clrMapOvr>
     <a:masterClrMapping/>

</xml_diff>

<commit_message>
added slide on what to check for errors
Former-commit-id: 4234d9aa77fd68ec21aa3b95c0dfcbe1f38311d8
</commit_message>
<xml_diff>
--- a/day05/slides/Day5_slides.pptx
+++ b/day05/slides/Day5_slides.pptx
@@ -5,7 +5,7 @@
     <p:sldMasterId id="2147483659" r:id="rId1"/>
   </p:sldMasterIdLst>
   <p:notesMasterIdLst>
-    <p:notesMasterId r:id="rId12"/>
+    <p:notesMasterId r:id="rId13"/>
   </p:notesMasterIdLst>
   <p:sldIdLst>
     <p:sldId id="256" r:id="rId2"/>
@@ -16,25 +16,26 @@
     <p:sldId id="263" r:id="rId7"/>
     <p:sldId id="271" r:id="rId8"/>
     <p:sldId id="269" r:id="rId9"/>
-    <p:sldId id="267" r:id="rId10"/>
-    <p:sldId id="266" r:id="rId11"/>
+    <p:sldId id="272" r:id="rId10"/>
+    <p:sldId id="267" r:id="rId11"/>
+    <p:sldId id="266" r:id="rId12"/>
   </p:sldIdLst>
   <p:sldSz cx="9144000" cy="5143500" type="screen16x9"/>
   <p:notesSz cx="6858000" cy="9144000"/>
   <p:embeddedFontLst>
     <p:embeddedFont>
       <p:font typeface="Calibri" panose="020F0502020204030204" pitchFamily="34" charset="0"/>
-      <p:regular r:id="rId13"/>
-      <p:bold r:id="rId14"/>
-      <p:italic r:id="rId15"/>
-      <p:boldItalic r:id="rId16"/>
+      <p:regular r:id="rId14"/>
+      <p:bold r:id="rId15"/>
+      <p:italic r:id="rId16"/>
+      <p:boldItalic r:id="rId17"/>
     </p:embeddedFont>
     <p:embeddedFont>
       <p:font typeface="Helvetica Neue" panose="02000503000000020004" pitchFamily="2" charset="0"/>
-      <p:regular r:id="rId17"/>
-      <p:bold r:id="rId18"/>
-      <p:italic r:id="rId19"/>
-      <p:boldItalic r:id="rId20"/>
+      <p:regular r:id="rId18"/>
+      <p:bold r:id="rId19"/>
+      <p:italic r:id="rId20"/>
+      <p:boldItalic r:id="rId21"/>
     </p:embeddedFont>
   </p:embeddedFontLst>
   <p:defaultTextStyle>
@@ -283,6 +284,36 @@
     </p:ext>
   </p:extLst>
 </p:presentation>
+</file>
+
+<file path=ppt/ink/ink1.xml><?xml version="1.0" encoding="utf-8"?>
+<inkml:ink xmlns:inkml="http://www.w3.org/2003/InkML">
+  <inkml:definitions>
+    <inkml:context xml:id="ctx0">
+      <inkml:inkSource xml:id="inkSrc0">
+        <inkml:traceFormat>
+          <inkml:channel name="X" type="integer" min="-2.14748E9" max="2.14748E9" units="cm"/>
+          <inkml:channel name="Y" type="integer" min="-2.14748E9" max="2.14748E9" units="cm"/>
+          <inkml:channel name="F" type="integer" max="32767" units="dev"/>
+        </inkml:traceFormat>
+        <inkml:channelProperties>
+          <inkml:channelProperty channel="X" name="resolution" value="1000" units="1/cm"/>
+          <inkml:channelProperty channel="Y" name="resolution" value="1000" units="1/cm"/>
+          <inkml:channelProperty channel="F" name="resolution" value="0" units="1/dev"/>
+        </inkml:channelProperties>
+      </inkml:inkSource>
+      <inkml:timestamp xml:id="ts0" timeString="2024-05-27T21:16:19.924"/>
+    </inkml:context>
+    <inkml:brush xml:id="br0">
+      <inkml:brushProperty name="width" value="0.3" units="cm"/>
+      <inkml:brushProperty name="height" value="0.6" units="cm"/>
+      <inkml:brushProperty name="color" value="#FFFC00"/>
+      <inkml:brushProperty name="tip" value="rectangle"/>
+      <inkml:brushProperty name="rasterOp" value="maskPen"/>
+    </inkml:brush>
+  </inkml:definitions>
+  <inkml:trace contextRef="#ctx0" brushRef="#br0">0 173 16383,'63'0'0,"0"0"0,1 0 0,-2 0 0,-9 0 0,-2 0 0,0 0 0,-2 0 0,38 0 0,-14 0 0,2 0 0,8 0 0,8 0 0,6 0 0,-8 0 0,-7 0 0,-8 0 0,-8 0 0,-8 0 0,-5 0 0,-4 0 0,4 2 0,3 3 0,0 2 0,2 0 0,0-1 0,1-4 0,-3 1 0,-4-3 0,-1 0 0,3 0 0,5 0 0,0 0 0,-1 0 0,-1 0 0,-3 0 0,-2 0 0,2 0 0,4 0 0,8 0 0,3 0 0,3 0 0,4-3 0,-3-2 0,-1-2 0,-7-1 0,-3 0 0,-4 3 0,-3-3 0,0 3 0,3 0 0,8-3 0,16 0 0,12-3 0,-44 6 0,0 0 0,44-4 0,-10 3 0,-11 3 0,-6 0 0,-2-3 0,0-2 0,0 0 0,4 3 0,0 3 0,4 1 0,6 1 0,-2-3 0,3 1 0,-4-1 0,-8 1 0,1 2 0,0 0 0,4 0 0,3 0 0,4 0 0,2-2 0,-2-1 0,-7 0 0,-8 0 0,-8 2 0,-6-1 0,-3 0 0,3-4 0,2 1 0,6 0 0,2-1 0,-1 1 0,2 0 0,0 3 0,4 0 0,8 2 0,5 0 0,-2 0 0,-11 0 0,-12 0 0,-13 0 0,-8 0 0,-5 0 0,-3 0 0,-4 0 0,-2 0 0,-3 0 0,-1 0 0,-1 0 0</inkml:trace>
+</inkml:ink>
 </file>
 
 <file path=ppt/notesMasters/notesMaster1.xml><?xml version="1.0" encoding="utf-8"?>
@@ -6523,6 +6554,72 @@
   <p:cSld>
     <p:spTree>
       <p:nvGrpSpPr>
+        <p:cNvPr id="1" name=""/>
+        <p:cNvGrpSpPr/>
+        <p:nvPr/>
+      </p:nvGrpSpPr>
+      <p:grpSpPr>
+        <a:xfrm>
+          <a:off x="0" y="0"/>
+          <a:ext cx="0" cy="0"/>
+          <a:chOff x="0" y="0"/>
+          <a:chExt cx="0" cy="0"/>
+        </a:xfrm>
+      </p:grpSpPr>
+      <p:sp>
+        <p:nvSpPr>
+          <p:cNvPr id="2" name="Title 1">
+            <a:extLst>
+              <a:ext uri="{FF2B5EF4-FFF2-40B4-BE49-F238E27FC236}">
+                <a16:creationId xmlns:a16="http://schemas.microsoft.com/office/drawing/2014/main" id="{B35014DD-EA81-BBBB-C2F1-270602064389}"/>
+              </a:ext>
+            </a:extLst>
+          </p:cNvPr>
+          <p:cNvSpPr>
+            <a:spLocks noGrp="1"/>
+          </p:cNvSpPr>
+          <p:nvPr>
+            <p:ph type="title"/>
+          </p:nvPr>
+        </p:nvSpPr>
+        <p:spPr>
+          <a:xfrm>
+            <a:off x="311700" y="1999050"/>
+            <a:ext cx="8520600" cy="572700"/>
+          </a:xfrm>
+        </p:spPr>
+        <p:txBody>
+          <a:bodyPr>
+            <a:noAutofit/>
+          </a:bodyPr>
+          <a:lstStyle/>
+          <a:p>
+            <a:pPr algn="ctr"/>
+            <a:r>
+              <a:rPr lang="en-US" sz="5400" dirty="0"/>
+              <a:t>Day 5: Assessment</a:t>
+            </a:r>
+          </a:p>
+        </p:txBody>
+      </p:sp>
+    </p:spTree>
+    <p:extLst>
+      <p:ext uri="{BB962C8B-B14F-4D97-AF65-F5344CB8AC3E}">
+        <p14:creationId xmlns:p14="http://schemas.microsoft.com/office/powerpoint/2010/main" val="2535294176"/>
+      </p:ext>
+    </p:extLst>
+  </p:cSld>
+  <p:clrMapOvr>
+    <a:masterClrMapping/>
+  </p:clrMapOvr>
+</p:sld>
+</file>
+
+<file path=ppt/slides/slide11.xml><?xml version="1.0" encoding="utf-8"?>
+<p:sld xmlns:a="http://schemas.openxmlformats.org/drawingml/2006/main" xmlns:r="http://schemas.openxmlformats.org/officeDocument/2006/relationships" xmlns:p="http://schemas.openxmlformats.org/presentationml/2006/main">
+  <p:cSld>
+    <p:spTree>
+      <p:nvGrpSpPr>
         <p:cNvPr id="1" name="Shape 166"/>
         <p:cNvGrpSpPr/>
         <p:nvPr/>
@@ -10390,7 +10487,7 @@
           <p:cNvPr id="2" name="Title 1">
             <a:extLst>
               <a:ext uri="{FF2B5EF4-FFF2-40B4-BE49-F238E27FC236}">
-                <a16:creationId xmlns:a16="http://schemas.microsoft.com/office/drawing/2014/main" id="{B35014DD-EA81-BBBB-C2F1-270602064389}"/>
+                <a16:creationId xmlns:a16="http://schemas.microsoft.com/office/drawing/2014/main" id="{2F0D7FBD-0859-097B-0681-783B62262FCC}"/>
               </a:ext>
             </a:extLst>
           </p:cNvPr>
@@ -10401,30 +10498,238 @@
             <p:ph type="title"/>
           </p:nvPr>
         </p:nvSpPr>
-        <p:spPr>
-          <a:xfrm>
-            <a:off x="311700" y="1999050"/>
-            <a:ext cx="8520600" cy="572700"/>
-          </a:xfrm>
-        </p:spPr>
+        <p:spPr/>
         <p:txBody>
           <a:bodyPr>
-            <a:noAutofit/>
+            <a:normAutofit fontScale="90000"/>
           </a:bodyPr>
           <a:lstStyle/>
           <a:p>
-            <a:pPr algn="ctr"/>
             <a:r>
-              <a:rPr lang="en-US" sz="5400" dirty="0"/>
-              <a:t>Day 5: Assessment</a:t>
+              <a:rPr lang="en-US" dirty="0"/>
+              <a:t>First things to check when error</a:t>
             </a:r>
           </a:p>
         </p:txBody>
       </p:sp>
+      <p:sp>
+        <p:nvSpPr>
+          <p:cNvPr id="3" name="Text Placeholder 2">
+            <a:extLst>
+              <a:ext uri="{FF2B5EF4-FFF2-40B4-BE49-F238E27FC236}">
+                <a16:creationId xmlns:a16="http://schemas.microsoft.com/office/drawing/2014/main" id="{5C8DD0E5-8B8E-6DD2-156D-C44AD382071A}"/>
+              </a:ext>
+            </a:extLst>
+          </p:cNvPr>
+          <p:cNvSpPr>
+            <a:spLocks noGrp="1"/>
+          </p:cNvSpPr>
+          <p:nvPr>
+            <p:ph type="body" idx="1"/>
+          </p:nvPr>
+        </p:nvSpPr>
+        <p:spPr/>
+        <p:txBody>
+          <a:bodyPr/>
+          <a:lstStyle/>
+          <a:p>
+            <a:pPr>
+              <a:buFont typeface="+mj-lt"/>
+              <a:buAutoNum type="arabicPeriod"/>
+            </a:pPr>
+            <a:r>
+              <a:rPr lang="en-US" dirty="0"/>
+              <a:t>Did you check what the error and output files said?</a:t>
+            </a:r>
+          </a:p>
+          <a:p>
+            <a:pPr lvl="1">
+              <a:buFont typeface="+mj-lt"/>
+              <a:buAutoNum type="arabicPeriod"/>
+            </a:pPr>
+            <a:r>
+              <a:rPr lang="en-US" dirty="0"/>
+              <a:t>If you can’t find them, check that you fixed the path in the script for these files</a:t>
+            </a:r>
+          </a:p>
+          <a:p>
+            <a:pPr>
+              <a:buFont typeface="+mj-lt"/>
+              <a:buAutoNum type="arabicPeriod"/>
+            </a:pPr>
+            <a:r>
+              <a:rPr lang="en-US" dirty="0"/>
+              <a:t>Reading an error:</a:t>
+            </a:r>
+          </a:p>
+          <a:p>
+            <a:pPr lvl="1">
+              <a:buFont typeface="+mj-lt"/>
+              <a:buAutoNum type="arabicPeriod"/>
+            </a:pPr>
+            <a:r>
+              <a:rPr lang="en-US" dirty="0"/>
+              <a:t>Usually the most helpful part of the error is at the </a:t>
+            </a:r>
+            <a:r>
+              <a:rPr lang="en-US" u="sng" dirty="0"/>
+              <a:t>bottom</a:t>
+            </a:r>
+            <a:r>
+              <a:rPr lang="en-US" dirty="0"/>
+              <a:t> of it </a:t>
+            </a:r>
+          </a:p>
+          <a:p>
+            <a:pPr>
+              <a:buFont typeface="+mj-lt"/>
+              <a:buAutoNum type="arabicPeriod"/>
+            </a:pPr>
+            <a:r>
+              <a:rPr lang="en-US" dirty="0"/>
+              <a:t>TYPOS (especially filenames and folders)</a:t>
+            </a:r>
+          </a:p>
+          <a:p>
+            <a:pPr marL="114300" indent="0">
+              <a:buNone/>
+            </a:pPr>
+            <a:endParaRPr lang="en-US" dirty="0"/>
+          </a:p>
+        </p:txBody>
+      </p:sp>
+      <p:pic>
+        <p:nvPicPr>
+          <p:cNvPr id="4" name="Picture 3">
+            <a:extLst>
+              <a:ext uri="{FF2B5EF4-FFF2-40B4-BE49-F238E27FC236}">
+                <a16:creationId xmlns:a16="http://schemas.microsoft.com/office/drawing/2014/main" id="{3052FB5A-685C-CAB5-EA49-B7C25EE8E647}"/>
+              </a:ext>
+            </a:extLst>
+          </p:cNvPr>
+          <p:cNvPicPr>
+            <a:picLocks noChangeAspect="1"/>
+          </p:cNvPicPr>
+          <p:nvPr/>
+        </p:nvPicPr>
+        <p:blipFill>
+          <a:blip r:embed="rId2"/>
+          <a:stretch>
+            <a:fillRect/>
+          </a:stretch>
+        </p:blipFill>
+        <p:spPr>
+          <a:xfrm>
+            <a:off x="524256" y="2860675"/>
+            <a:ext cx="3523488" cy="2212882"/>
+          </a:xfrm>
+          <a:prstGeom prst="rect">
+            <a:avLst/>
+          </a:prstGeom>
+        </p:spPr>
+      </p:pic>
+      <mc:AlternateContent xmlns:mc="http://schemas.openxmlformats.org/markup-compatibility/2006">
+        <mc:Choice xmlns:p14="http://schemas.microsoft.com/office/powerpoint/2010/main" Requires="p14">
+          <p:contentPart p14:bwMode="auto" r:id="rId3">
+            <p14:nvContentPartPr>
+              <p14:cNvPr id="5" name="Ink 4">
+                <a:extLst>
+                  <a:ext uri="{FF2B5EF4-FFF2-40B4-BE49-F238E27FC236}">
+                    <a16:creationId xmlns:a16="http://schemas.microsoft.com/office/drawing/2014/main" id="{DEF0E6F3-8D3C-2781-8472-8B68FAF0E629}"/>
+                  </a:ext>
+                </a:extLst>
+              </p14:cNvPr>
+              <p14:cNvContentPartPr/>
+              <p14:nvPr/>
+            </p14:nvContentPartPr>
+            <p14:xfrm>
+              <a:off x="545520" y="4934784"/>
+              <a:ext cx="2348280" cy="73800"/>
+            </p14:xfrm>
+          </p:contentPart>
+        </mc:Choice>
+        <mc:Fallback>
+          <p:pic>
+            <p:nvPicPr>
+              <p:cNvPr id="5" name="Ink 4">
+                <a:extLst>
+                  <a:ext uri="{FF2B5EF4-FFF2-40B4-BE49-F238E27FC236}">
+                    <a16:creationId xmlns:a16="http://schemas.microsoft.com/office/drawing/2014/main" id="{DEF0E6F3-8D3C-2781-8472-8B68FAF0E629}"/>
+                  </a:ext>
+                </a:extLst>
+              </p:cNvPr>
+              <p:cNvPicPr/>
+              <p:nvPr/>
+            </p:nvPicPr>
+            <p:blipFill>
+              <a:blip r:embed="rId4"/>
+              <a:stretch>
+                <a:fillRect/>
+              </a:stretch>
+            </p:blipFill>
+            <p:spPr>
+              <a:xfrm>
+                <a:off x="491520" y="4827144"/>
+                <a:ext cx="2455920" cy="289440"/>
+              </a:xfrm>
+              <a:prstGeom prst="rect">
+                <a:avLst/>
+              </a:prstGeom>
+            </p:spPr>
+          </p:pic>
+        </mc:Fallback>
+      </mc:AlternateContent>
+      <p:pic>
+        <p:nvPicPr>
+          <p:cNvPr id="2050" name="Picture 2">
+            <a:extLst>
+              <a:ext uri="{FF2B5EF4-FFF2-40B4-BE49-F238E27FC236}">
+                <a16:creationId xmlns:a16="http://schemas.microsoft.com/office/drawing/2014/main" id="{24AE2344-0959-1841-8C94-9259FDA9FAA8}"/>
+              </a:ext>
+            </a:extLst>
+          </p:cNvPr>
+          <p:cNvPicPr>
+            <a:picLocks noChangeAspect="1" noChangeArrowheads="1"/>
+          </p:cNvPicPr>
+          <p:nvPr/>
+        </p:nvPicPr>
+        <p:blipFill>
+          <a:blip r:embed="rId5">
+            <a:extLst>
+              <a:ext uri="{28A0092B-C50C-407E-A947-70E740481C1C}">
+                <a14:useLocalDpi xmlns:a14="http://schemas.microsoft.com/office/drawing/2010/main" val="0"/>
+              </a:ext>
+            </a:extLst>
+          </a:blip>
+          <a:srcRect/>
+          <a:stretch>
+            <a:fillRect/>
+          </a:stretch>
+        </p:blipFill>
+        <p:spPr bwMode="auto">
+          <a:xfrm>
+            <a:off x="4369546" y="2860675"/>
+            <a:ext cx="4570021" cy="1831975"/>
+          </a:xfrm>
+          <a:prstGeom prst="rect">
+            <a:avLst/>
+          </a:prstGeom>
+          <a:noFill/>
+          <a:extLst>
+            <a:ext uri="{909E8E84-426E-40DD-AFC4-6F175D3DCCD1}">
+              <a14:hiddenFill xmlns:a14="http://schemas.microsoft.com/office/drawing/2010/main">
+                <a:solidFill>
+                  <a:srgbClr val="FFFFFF"/>
+                </a:solidFill>
+              </a14:hiddenFill>
+            </a:ext>
+          </a:extLst>
+        </p:spPr>
+      </p:pic>
     </p:spTree>
     <p:extLst>
       <p:ext uri="{BB962C8B-B14F-4D97-AF65-F5344CB8AC3E}">
-        <p14:creationId xmlns:p14="http://schemas.microsoft.com/office/powerpoint/2010/main" val="2535294176"/>
+        <p14:creationId xmlns:p14="http://schemas.microsoft.com/office/powerpoint/2010/main" val="1939924428"/>
       </p:ext>
     </p:extLst>
   </p:cSld>

</xml_diff>